<commit_message>
checkpoint - everything is working
I just got everything working again
</commit_message>
<xml_diff>
--- a/troubleshooting.pptx
+++ b/troubleshooting.pptx
@@ -1,6 +1,6 @@
 
 <file path=ppt/presentation.xml><?xml version="1.0" encoding="utf-8"?>
-<p:presentation xmlns:a="http://schemas.openxmlformats.org/drawingml/2006/main" xmlns:p="http://schemas.openxmlformats.org/presentationml/2006/main" xmlns:r="http://schemas.openxmlformats.org/officeDocument/2006/relationships" saveSubsetFonts="1">
+<p:presentation xmlns:p="http://schemas.openxmlformats.org/presentationml/2006/main" xmlns:a="http://schemas.openxmlformats.org/drawingml/2006/main" xmlns:r="http://schemas.openxmlformats.org/officeDocument/2006/relationships" saveSubsetFonts="1">
   <p:sldMasterIdLst>
     <p:sldMasterId id="2147483663" r:id="rId2"/>
   </p:sldMasterIdLst>
@@ -173,7 +173,7 @@
 </file>
 
 <file path=ppt/slides/slide1.xml><?xml version="1.0" encoding="utf-8"?>
-<p:sld xmlns:a="http://schemas.openxmlformats.org/drawingml/2006/main" xmlns:p="http://schemas.openxmlformats.org/presentationml/2006/main" xmlns:r="http://schemas.openxmlformats.org/officeDocument/2006/relationships">
+<p:sld xmlns:p="http://schemas.openxmlformats.org/presentationml/2006/main" xmlns:a="http://schemas.openxmlformats.org/drawingml/2006/main" xmlns:r="http://schemas.openxmlformats.org/officeDocument/2006/relationships">
   <p:cSld>
     <p:spTree>
       <p:nvGrpSpPr>
@@ -285,7 +285,7 @@
 </file>
 
 <file path=ppt/slides/slide10.xml><?xml version="1.0" encoding="utf-8"?>
-<p:sld xmlns:a="http://schemas.openxmlformats.org/drawingml/2006/main" xmlns:p="http://schemas.openxmlformats.org/presentationml/2006/main" xmlns:r="http://schemas.openxmlformats.org/officeDocument/2006/relationships">
+<p:sld xmlns:p="http://schemas.openxmlformats.org/presentationml/2006/main" xmlns:a="http://schemas.openxmlformats.org/drawingml/2006/main" xmlns:r="http://schemas.openxmlformats.org/officeDocument/2006/relationships">
   <p:cSld>
     <p:spTree>
       <p:nvGrpSpPr>
@@ -317,8 +317,8 @@
         </p:blipFill>
         <p:spPr>
           <a:xfrm>
-            <a:off x="771141" y="0"/>
-            <a:ext cx="9430517" cy="5486400"/>
+            <a:off x="144672" y="0"/>
+            <a:ext cx="10683456" cy="5486400"/>
           </a:xfrm>
           <a:prstGeom prst="rect">
             <a:avLst/>
@@ -334,7 +334,7 @@
 </file>
 
 <file path=ppt/slides/slide11.xml><?xml version="1.0" encoding="utf-8"?>
-<p:sld xmlns:a="http://schemas.openxmlformats.org/drawingml/2006/main" xmlns:p="http://schemas.openxmlformats.org/presentationml/2006/main" xmlns:r="http://schemas.openxmlformats.org/officeDocument/2006/relationships">
+<p:sld xmlns:p="http://schemas.openxmlformats.org/presentationml/2006/main" xmlns:a="http://schemas.openxmlformats.org/drawingml/2006/main" xmlns:r="http://schemas.openxmlformats.org/officeDocument/2006/relationships">
   <p:cSld>
     <p:spTree>
       <p:nvGrpSpPr>
@@ -366,8 +366,8 @@
         </p:blipFill>
         <p:spPr>
           <a:xfrm>
-            <a:off x="771141" y="0"/>
-            <a:ext cx="9430517" cy="5486400"/>
+            <a:off x="144672" y="0"/>
+            <a:ext cx="10683456" cy="5486400"/>
           </a:xfrm>
           <a:prstGeom prst="rect">
             <a:avLst/>
@@ -383,7 +383,7 @@
 </file>
 
 <file path=ppt/slides/slide12.xml><?xml version="1.0" encoding="utf-8"?>
-<p:sld xmlns:a="http://schemas.openxmlformats.org/drawingml/2006/main" xmlns:p="http://schemas.openxmlformats.org/presentationml/2006/main" xmlns:r="http://schemas.openxmlformats.org/officeDocument/2006/relationships">
+<p:sld xmlns:p="http://schemas.openxmlformats.org/presentationml/2006/main" xmlns:a="http://schemas.openxmlformats.org/drawingml/2006/main" xmlns:r="http://schemas.openxmlformats.org/officeDocument/2006/relationships">
   <p:cSld>
     <p:spTree>
       <p:nvGrpSpPr>
@@ -415,8 +415,8 @@
         </p:blipFill>
         <p:spPr>
           <a:xfrm>
-            <a:off x="771141" y="0"/>
-            <a:ext cx="9430517" cy="5486400"/>
+            <a:off x="144672" y="0"/>
+            <a:ext cx="10683456" cy="5486400"/>
           </a:xfrm>
           <a:prstGeom prst="rect">
             <a:avLst/>
@@ -432,7 +432,7 @@
 </file>
 
 <file path=ppt/slides/slide13.xml><?xml version="1.0" encoding="utf-8"?>
-<p:sld xmlns:a="http://schemas.openxmlformats.org/drawingml/2006/main" xmlns:p="http://schemas.openxmlformats.org/presentationml/2006/main" xmlns:r="http://schemas.openxmlformats.org/officeDocument/2006/relationships">
+<p:sld xmlns:p="http://schemas.openxmlformats.org/presentationml/2006/main" xmlns:a="http://schemas.openxmlformats.org/drawingml/2006/main" xmlns:r="http://schemas.openxmlformats.org/officeDocument/2006/relationships">
   <p:cSld>
     <p:spTree>
       <p:nvGrpSpPr>
@@ -464,8 +464,8 @@
         </p:blipFill>
         <p:spPr>
           <a:xfrm>
-            <a:off x="771141" y="0"/>
-            <a:ext cx="9430517" cy="5486400"/>
+            <a:off x="144672" y="0"/>
+            <a:ext cx="10683456" cy="5486400"/>
           </a:xfrm>
           <a:prstGeom prst="rect">
             <a:avLst/>
@@ -481,7 +481,7 @@
 </file>
 
 <file path=ppt/slides/slide14.xml><?xml version="1.0" encoding="utf-8"?>
-<p:sld xmlns:a="http://schemas.openxmlformats.org/drawingml/2006/main" xmlns:p="http://schemas.openxmlformats.org/presentationml/2006/main" xmlns:r="http://schemas.openxmlformats.org/officeDocument/2006/relationships">
+<p:sld xmlns:p="http://schemas.openxmlformats.org/presentationml/2006/main" xmlns:a="http://schemas.openxmlformats.org/drawingml/2006/main" xmlns:r="http://schemas.openxmlformats.org/officeDocument/2006/relationships">
   <p:cSld>
     <p:spTree>
       <p:nvGrpSpPr>
@@ -513,8 +513,8 @@
         </p:blipFill>
         <p:spPr>
           <a:xfrm>
-            <a:off x="771141" y="0"/>
-            <a:ext cx="9430517" cy="5486400"/>
+            <a:off x="144672" y="0"/>
+            <a:ext cx="10683456" cy="5486400"/>
           </a:xfrm>
           <a:prstGeom prst="rect">
             <a:avLst/>
@@ -530,7 +530,7 @@
 </file>
 
 <file path=ppt/slides/slide15.xml><?xml version="1.0" encoding="utf-8"?>
-<p:sld xmlns:a="http://schemas.openxmlformats.org/drawingml/2006/main" xmlns:p="http://schemas.openxmlformats.org/presentationml/2006/main" xmlns:r="http://schemas.openxmlformats.org/officeDocument/2006/relationships">
+<p:sld xmlns:p="http://schemas.openxmlformats.org/presentationml/2006/main" xmlns:a="http://schemas.openxmlformats.org/drawingml/2006/main" xmlns:r="http://schemas.openxmlformats.org/officeDocument/2006/relationships">
   <p:cSld>
     <p:spTree>
       <p:nvGrpSpPr>
@@ -562,8 +562,8 @@
         </p:blipFill>
         <p:spPr>
           <a:xfrm>
-            <a:off x="771141" y="0"/>
-            <a:ext cx="9430517" cy="5486400"/>
+            <a:off x="144672" y="0"/>
+            <a:ext cx="10683456" cy="5486400"/>
           </a:xfrm>
           <a:prstGeom prst="rect">
             <a:avLst/>
@@ -579,7 +579,7 @@
 </file>
 
 <file path=ppt/slides/slide16.xml><?xml version="1.0" encoding="utf-8"?>
-<p:sld xmlns:a="http://schemas.openxmlformats.org/drawingml/2006/main" xmlns:p="http://schemas.openxmlformats.org/presentationml/2006/main" xmlns:r="http://schemas.openxmlformats.org/officeDocument/2006/relationships">
+<p:sld xmlns:p="http://schemas.openxmlformats.org/presentationml/2006/main" xmlns:a="http://schemas.openxmlformats.org/drawingml/2006/main" xmlns:r="http://schemas.openxmlformats.org/officeDocument/2006/relationships">
   <p:cSld>
     <p:spTree>
       <p:nvGrpSpPr>
@@ -611,8 +611,8 @@
         </p:blipFill>
         <p:spPr>
           <a:xfrm>
-            <a:off x="771141" y="0"/>
-            <a:ext cx="9430517" cy="5486400"/>
+            <a:off x="144672" y="0"/>
+            <a:ext cx="10683456" cy="5486400"/>
           </a:xfrm>
           <a:prstGeom prst="rect">
             <a:avLst/>
@@ -628,7 +628,7 @@
 </file>
 
 <file path=ppt/slides/slide17.xml><?xml version="1.0" encoding="utf-8"?>
-<p:sld xmlns:a="http://schemas.openxmlformats.org/drawingml/2006/main" xmlns:p="http://schemas.openxmlformats.org/presentationml/2006/main" xmlns:r="http://schemas.openxmlformats.org/officeDocument/2006/relationships">
+<p:sld xmlns:p="http://schemas.openxmlformats.org/presentationml/2006/main" xmlns:a="http://schemas.openxmlformats.org/drawingml/2006/main" xmlns:r="http://schemas.openxmlformats.org/officeDocument/2006/relationships">
   <p:cSld>
     <p:spTree>
       <p:nvGrpSpPr>
@@ -660,8 +660,8 @@
         </p:blipFill>
         <p:spPr>
           <a:xfrm>
-            <a:off x="771141" y="0"/>
-            <a:ext cx="9430517" cy="5486400"/>
+            <a:off x="144672" y="0"/>
+            <a:ext cx="10683456" cy="5486400"/>
           </a:xfrm>
           <a:prstGeom prst="rect">
             <a:avLst/>
@@ -677,7 +677,7 @@
 </file>
 
 <file path=ppt/slides/slide18.xml><?xml version="1.0" encoding="utf-8"?>
-<p:sld xmlns:a="http://schemas.openxmlformats.org/drawingml/2006/main" xmlns:p="http://schemas.openxmlformats.org/presentationml/2006/main" xmlns:r="http://schemas.openxmlformats.org/officeDocument/2006/relationships">
+<p:sld xmlns:p="http://schemas.openxmlformats.org/presentationml/2006/main" xmlns:a="http://schemas.openxmlformats.org/drawingml/2006/main" xmlns:r="http://schemas.openxmlformats.org/officeDocument/2006/relationships">
   <p:cSld>
     <p:spTree>
       <p:nvGrpSpPr>
@@ -709,8 +709,8 @@
         </p:blipFill>
         <p:spPr>
           <a:xfrm>
-            <a:off x="771141" y="0"/>
-            <a:ext cx="9430517" cy="5486400"/>
+            <a:off x="144672" y="0"/>
+            <a:ext cx="10683456" cy="5486400"/>
           </a:xfrm>
           <a:prstGeom prst="rect">
             <a:avLst/>
@@ -726,7 +726,7 @@
 </file>
 
 <file path=ppt/slides/slide19.xml><?xml version="1.0" encoding="utf-8"?>
-<p:sld xmlns:a="http://schemas.openxmlformats.org/drawingml/2006/main" xmlns:p="http://schemas.openxmlformats.org/presentationml/2006/main" xmlns:r="http://schemas.openxmlformats.org/officeDocument/2006/relationships">
+<p:sld xmlns:p="http://schemas.openxmlformats.org/presentationml/2006/main" xmlns:a="http://schemas.openxmlformats.org/drawingml/2006/main" xmlns:r="http://schemas.openxmlformats.org/officeDocument/2006/relationships">
   <p:cSld>
     <p:spTree>
       <p:nvGrpSpPr>
@@ -758,8 +758,8 @@
         </p:blipFill>
         <p:spPr>
           <a:xfrm>
-            <a:off x="771141" y="0"/>
-            <a:ext cx="9430517" cy="5486400"/>
+            <a:off x="144672" y="0"/>
+            <a:ext cx="10683456" cy="5486400"/>
           </a:xfrm>
           <a:prstGeom prst="rect">
             <a:avLst/>
@@ -775,7 +775,7 @@
 </file>
 
 <file path=ppt/slides/slide2.xml><?xml version="1.0" encoding="utf-8"?>
-<p:sld xmlns:a="http://schemas.openxmlformats.org/drawingml/2006/main" xmlns:p="http://schemas.openxmlformats.org/presentationml/2006/main" xmlns:r="http://schemas.openxmlformats.org/officeDocument/2006/relationships">
+<p:sld xmlns:p="http://schemas.openxmlformats.org/presentationml/2006/main" xmlns:a="http://schemas.openxmlformats.org/drawingml/2006/main" xmlns:r="http://schemas.openxmlformats.org/officeDocument/2006/relationships">
   <p:cSld>
     <p:spTree>
       <p:nvGrpSpPr>
@@ -974,7 +974,7 @@
 </file>
 
 <file path=ppt/slides/slide20.xml><?xml version="1.0" encoding="utf-8"?>
-<p:sld xmlns:a="http://schemas.openxmlformats.org/drawingml/2006/main" xmlns:p="http://schemas.openxmlformats.org/presentationml/2006/main" xmlns:r="http://schemas.openxmlformats.org/officeDocument/2006/relationships">
+<p:sld xmlns:p="http://schemas.openxmlformats.org/presentationml/2006/main" xmlns:a="http://schemas.openxmlformats.org/drawingml/2006/main" xmlns:r="http://schemas.openxmlformats.org/officeDocument/2006/relationships">
   <p:cSld>
     <p:spTree>
       <p:nvGrpSpPr>
@@ -1006,8 +1006,8 @@
         </p:blipFill>
         <p:spPr>
           <a:xfrm>
-            <a:off x="771141" y="0"/>
-            <a:ext cx="9430517" cy="5486400"/>
+            <a:off x="144672" y="0"/>
+            <a:ext cx="10683456" cy="5486400"/>
           </a:xfrm>
           <a:prstGeom prst="rect">
             <a:avLst/>
@@ -1023,7 +1023,7 @@
 </file>
 
 <file path=ppt/slides/slide21.xml><?xml version="1.0" encoding="utf-8"?>
-<p:sld xmlns:a="http://schemas.openxmlformats.org/drawingml/2006/main" xmlns:p="http://schemas.openxmlformats.org/presentationml/2006/main" xmlns:r="http://schemas.openxmlformats.org/officeDocument/2006/relationships">
+<p:sld xmlns:p="http://schemas.openxmlformats.org/presentationml/2006/main" xmlns:a="http://schemas.openxmlformats.org/drawingml/2006/main" xmlns:r="http://schemas.openxmlformats.org/officeDocument/2006/relationships">
   <p:cSld>
     <p:spTree>
       <p:nvGrpSpPr>
@@ -1055,8 +1055,8 @@
         </p:blipFill>
         <p:spPr>
           <a:xfrm>
-            <a:off x="771141" y="0"/>
-            <a:ext cx="9430517" cy="5486400"/>
+            <a:off x="144672" y="0"/>
+            <a:ext cx="10683456" cy="5486400"/>
           </a:xfrm>
           <a:prstGeom prst="rect">
             <a:avLst/>
@@ -1072,7 +1072,7 @@
 </file>
 
 <file path=ppt/slides/slide22.xml><?xml version="1.0" encoding="utf-8"?>
-<p:sld xmlns:a="http://schemas.openxmlformats.org/drawingml/2006/main" xmlns:p="http://schemas.openxmlformats.org/presentationml/2006/main" xmlns:r="http://schemas.openxmlformats.org/officeDocument/2006/relationships">
+<p:sld xmlns:p="http://schemas.openxmlformats.org/presentationml/2006/main" xmlns:a="http://schemas.openxmlformats.org/drawingml/2006/main" xmlns:r="http://schemas.openxmlformats.org/officeDocument/2006/relationships">
   <p:cSld>
     <p:spTree>
       <p:nvGrpSpPr>
@@ -1104,8 +1104,8 @@
         </p:blipFill>
         <p:spPr>
           <a:xfrm>
-            <a:off x="771141" y="0"/>
-            <a:ext cx="9430517" cy="5486400"/>
+            <a:off x="144672" y="0"/>
+            <a:ext cx="10683456" cy="5486400"/>
           </a:xfrm>
           <a:prstGeom prst="rect">
             <a:avLst/>
@@ -1121,7 +1121,7 @@
 </file>
 
 <file path=ppt/slides/slide23.xml><?xml version="1.0" encoding="utf-8"?>
-<p:sld xmlns:a="http://schemas.openxmlformats.org/drawingml/2006/main" xmlns:p="http://schemas.openxmlformats.org/presentationml/2006/main" xmlns:r="http://schemas.openxmlformats.org/officeDocument/2006/relationships">
+<p:sld xmlns:p="http://schemas.openxmlformats.org/presentationml/2006/main" xmlns:a="http://schemas.openxmlformats.org/drawingml/2006/main" xmlns:r="http://schemas.openxmlformats.org/officeDocument/2006/relationships">
   <p:cSld>
     <p:spTree>
       <p:nvGrpSpPr>
@@ -1153,8 +1153,8 @@
         </p:blipFill>
         <p:spPr>
           <a:xfrm>
-            <a:off x="771141" y="0"/>
-            <a:ext cx="9430517" cy="5486400"/>
+            <a:off x="144672" y="0"/>
+            <a:ext cx="10683456" cy="5486400"/>
           </a:xfrm>
           <a:prstGeom prst="rect">
             <a:avLst/>
@@ -1170,7 +1170,7 @@
 </file>
 
 <file path=ppt/slides/slide24.xml><?xml version="1.0" encoding="utf-8"?>
-<p:sld xmlns:a="http://schemas.openxmlformats.org/drawingml/2006/main" xmlns:p="http://schemas.openxmlformats.org/presentationml/2006/main" xmlns:r="http://schemas.openxmlformats.org/officeDocument/2006/relationships">
+<p:sld xmlns:p="http://schemas.openxmlformats.org/presentationml/2006/main" xmlns:a="http://schemas.openxmlformats.org/drawingml/2006/main" xmlns:r="http://schemas.openxmlformats.org/officeDocument/2006/relationships">
   <p:cSld>
     <p:spTree>
       <p:nvGrpSpPr>
@@ -1202,8 +1202,8 @@
         </p:blipFill>
         <p:spPr>
           <a:xfrm>
-            <a:off x="771141" y="0"/>
-            <a:ext cx="9430517" cy="5486400"/>
+            <a:off x="144672" y="0"/>
+            <a:ext cx="10683456" cy="5486400"/>
           </a:xfrm>
           <a:prstGeom prst="rect">
             <a:avLst/>
@@ -1219,7 +1219,7 @@
 </file>
 
 <file path=ppt/slides/slide25.xml><?xml version="1.0" encoding="utf-8"?>
-<p:sld xmlns:a="http://schemas.openxmlformats.org/drawingml/2006/main" xmlns:p="http://schemas.openxmlformats.org/presentationml/2006/main" xmlns:r="http://schemas.openxmlformats.org/officeDocument/2006/relationships">
+<p:sld xmlns:p="http://schemas.openxmlformats.org/presentationml/2006/main" xmlns:a="http://schemas.openxmlformats.org/drawingml/2006/main" xmlns:r="http://schemas.openxmlformats.org/officeDocument/2006/relationships">
   <p:cSld>
     <p:spTree>
       <p:nvGrpSpPr>
@@ -1251,8 +1251,8 @@
         </p:blipFill>
         <p:spPr>
           <a:xfrm>
-            <a:off x="771141" y="0"/>
-            <a:ext cx="9430517" cy="5486400"/>
+            <a:off x="144672" y="0"/>
+            <a:ext cx="10683456" cy="5486400"/>
           </a:xfrm>
           <a:prstGeom prst="rect">
             <a:avLst/>
@@ -1268,7 +1268,7 @@
 </file>
 
 <file path=ppt/slides/slide26.xml><?xml version="1.0" encoding="utf-8"?>
-<p:sld xmlns:a="http://schemas.openxmlformats.org/drawingml/2006/main" xmlns:p="http://schemas.openxmlformats.org/presentationml/2006/main" xmlns:r="http://schemas.openxmlformats.org/officeDocument/2006/relationships">
+<p:sld xmlns:p="http://schemas.openxmlformats.org/presentationml/2006/main" xmlns:a="http://schemas.openxmlformats.org/drawingml/2006/main" xmlns:r="http://schemas.openxmlformats.org/officeDocument/2006/relationships">
   <p:cSld>
     <p:spTree>
       <p:nvGrpSpPr>
@@ -1300,8 +1300,8 @@
         </p:blipFill>
         <p:spPr>
           <a:xfrm>
-            <a:off x="771141" y="0"/>
-            <a:ext cx="9430517" cy="5486400"/>
+            <a:off x="144672" y="0"/>
+            <a:ext cx="10683456" cy="5486400"/>
           </a:xfrm>
           <a:prstGeom prst="rect">
             <a:avLst/>
@@ -1317,7 +1317,7 @@
 </file>
 
 <file path=ppt/slides/slide27.xml><?xml version="1.0" encoding="utf-8"?>
-<p:sld xmlns:a="http://schemas.openxmlformats.org/drawingml/2006/main" xmlns:p="http://schemas.openxmlformats.org/presentationml/2006/main" xmlns:r="http://schemas.openxmlformats.org/officeDocument/2006/relationships">
+<p:sld xmlns:p="http://schemas.openxmlformats.org/presentationml/2006/main" xmlns:a="http://schemas.openxmlformats.org/drawingml/2006/main" xmlns:r="http://schemas.openxmlformats.org/officeDocument/2006/relationships">
   <p:cSld>
     <p:spTree>
       <p:nvGrpSpPr>
@@ -1349,8 +1349,8 @@
         </p:blipFill>
         <p:spPr>
           <a:xfrm>
-            <a:off x="771141" y="0"/>
-            <a:ext cx="9430517" cy="5486400"/>
+            <a:off x="144672" y="0"/>
+            <a:ext cx="10683456" cy="5486400"/>
           </a:xfrm>
           <a:prstGeom prst="rect">
             <a:avLst/>
@@ -1366,7 +1366,7 @@
 </file>
 
 <file path=ppt/slides/slide28.xml><?xml version="1.0" encoding="utf-8"?>
-<p:sld xmlns:a="http://schemas.openxmlformats.org/drawingml/2006/main" xmlns:p="http://schemas.openxmlformats.org/presentationml/2006/main" xmlns:r="http://schemas.openxmlformats.org/officeDocument/2006/relationships">
+<p:sld xmlns:p="http://schemas.openxmlformats.org/presentationml/2006/main" xmlns:a="http://schemas.openxmlformats.org/drawingml/2006/main" xmlns:r="http://schemas.openxmlformats.org/officeDocument/2006/relationships">
   <p:cSld>
     <p:spTree>
       <p:nvGrpSpPr>
@@ -1398,8 +1398,8 @@
         </p:blipFill>
         <p:spPr>
           <a:xfrm>
-            <a:off x="771141" y="0"/>
-            <a:ext cx="9430517" cy="5486400"/>
+            <a:off x="144672" y="0"/>
+            <a:ext cx="10683456" cy="5486400"/>
           </a:xfrm>
           <a:prstGeom prst="rect">
             <a:avLst/>
@@ -1415,7 +1415,7 @@
 </file>
 
 <file path=ppt/slides/slide29.xml><?xml version="1.0" encoding="utf-8"?>
-<p:sld xmlns:a="http://schemas.openxmlformats.org/drawingml/2006/main" xmlns:p="http://schemas.openxmlformats.org/presentationml/2006/main" xmlns:r="http://schemas.openxmlformats.org/officeDocument/2006/relationships">
+<p:sld xmlns:p="http://schemas.openxmlformats.org/presentationml/2006/main" xmlns:a="http://schemas.openxmlformats.org/drawingml/2006/main" xmlns:r="http://schemas.openxmlformats.org/officeDocument/2006/relationships">
   <p:cSld>
     <p:spTree>
       <p:nvGrpSpPr>
@@ -1447,8 +1447,8 @@
         </p:blipFill>
         <p:spPr>
           <a:xfrm>
-            <a:off x="771141" y="0"/>
-            <a:ext cx="9430517" cy="5486400"/>
+            <a:off x="144672" y="0"/>
+            <a:ext cx="10683456" cy="5486400"/>
           </a:xfrm>
           <a:prstGeom prst="rect">
             <a:avLst/>
@@ -1464,7 +1464,7 @@
 </file>
 
 <file path=ppt/slides/slide3.xml><?xml version="1.0" encoding="utf-8"?>
-<p:sld xmlns:a="http://schemas.openxmlformats.org/drawingml/2006/main" xmlns:p="http://schemas.openxmlformats.org/presentationml/2006/main" xmlns:r="http://schemas.openxmlformats.org/officeDocument/2006/relationships">
+<p:sld xmlns:p="http://schemas.openxmlformats.org/presentationml/2006/main" xmlns:a="http://schemas.openxmlformats.org/drawingml/2006/main" xmlns:r="http://schemas.openxmlformats.org/officeDocument/2006/relationships">
   <p:cSld>
     <p:spTree>
       <p:nvGrpSpPr>
@@ -1496,8 +1496,8 @@
         </p:blipFill>
         <p:spPr>
           <a:xfrm>
-            <a:off x="771141" y="0"/>
-            <a:ext cx="9430517" cy="5486400"/>
+            <a:off x="144672" y="0"/>
+            <a:ext cx="10683456" cy="5486400"/>
           </a:xfrm>
           <a:prstGeom prst="rect">
             <a:avLst/>
@@ -1513,7 +1513,7 @@
 </file>
 
 <file path=ppt/slides/slide30.xml><?xml version="1.0" encoding="utf-8"?>
-<p:sld xmlns:a="http://schemas.openxmlformats.org/drawingml/2006/main" xmlns:p="http://schemas.openxmlformats.org/presentationml/2006/main" xmlns:r="http://schemas.openxmlformats.org/officeDocument/2006/relationships">
+<p:sld xmlns:p="http://schemas.openxmlformats.org/presentationml/2006/main" xmlns:a="http://schemas.openxmlformats.org/drawingml/2006/main" xmlns:r="http://schemas.openxmlformats.org/officeDocument/2006/relationships">
   <p:cSld>
     <p:spTree>
       <p:nvGrpSpPr>
@@ -1545,8 +1545,8 @@
         </p:blipFill>
         <p:spPr>
           <a:xfrm>
-            <a:off x="771141" y="0"/>
-            <a:ext cx="9430517" cy="5486400"/>
+            <a:off x="144672" y="0"/>
+            <a:ext cx="10683456" cy="5486400"/>
           </a:xfrm>
           <a:prstGeom prst="rect">
             <a:avLst/>
@@ -1562,7 +1562,7 @@
 </file>
 
 <file path=ppt/slides/slide31.xml><?xml version="1.0" encoding="utf-8"?>
-<p:sld xmlns:a="http://schemas.openxmlformats.org/drawingml/2006/main" xmlns:p="http://schemas.openxmlformats.org/presentationml/2006/main" xmlns:r="http://schemas.openxmlformats.org/officeDocument/2006/relationships">
+<p:sld xmlns:p="http://schemas.openxmlformats.org/presentationml/2006/main" xmlns:a="http://schemas.openxmlformats.org/drawingml/2006/main" xmlns:r="http://schemas.openxmlformats.org/officeDocument/2006/relationships">
   <p:cSld>
     <p:spTree>
       <p:nvGrpSpPr>
@@ -1594,8 +1594,8 @@
         </p:blipFill>
         <p:spPr>
           <a:xfrm>
-            <a:off x="771141" y="0"/>
-            <a:ext cx="9430517" cy="5486400"/>
+            <a:off x="144672" y="0"/>
+            <a:ext cx="10683456" cy="5486400"/>
           </a:xfrm>
           <a:prstGeom prst="rect">
             <a:avLst/>
@@ -1611,7 +1611,7 @@
 </file>
 
 <file path=ppt/slides/slide32.xml><?xml version="1.0" encoding="utf-8"?>
-<p:sld xmlns:a="http://schemas.openxmlformats.org/drawingml/2006/main" xmlns:p="http://schemas.openxmlformats.org/presentationml/2006/main" xmlns:r="http://schemas.openxmlformats.org/officeDocument/2006/relationships">
+<p:sld xmlns:p="http://schemas.openxmlformats.org/presentationml/2006/main" xmlns:a="http://schemas.openxmlformats.org/drawingml/2006/main" xmlns:r="http://schemas.openxmlformats.org/officeDocument/2006/relationships">
   <p:cSld>
     <p:spTree>
       <p:nvGrpSpPr>
@@ -1643,8 +1643,8 @@
         </p:blipFill>
         <p:spPr>
           <a:xfrm>
-            <a:off x="771141" y="0"/>
-            <a:ext cx="9430517" cy="5486400"/>
+            <a:off x="144672" y="0"/>
+            <a:ext cx="10683456" cy="5486400"/>
           </a:xfrm>
           <a:prstGeom prst="rect">
             <a:avLst/>
@@ -1660,7 +1660,7 @@
 </file>
 
 <file path=ppt/slides/slide33.xml><?xml version="1.0" encoding="utf-8"?>
-<p:sld xmlns:a="http://schemas.openxmlformats.org/drawingml/2006/main" xmlns:p="http://schemas.openxmlformats.org/presentationml/2006/main" xmlns:r="http://schemas.openxmlformats.org/officeDocument/2006/relationships">
+<p:sld xmlns:p="http://schemas.openxmlformats.org/presentationml/2006/main" xmlns:a="http://schemas.openxmlformats.org/drawingml/2006/main" xmlns:r="http://schemas.openxmlformats.org/officeDocument/2006/relationships">
   <p:cSld>
     <p:spTree>
       <p:nvGrpSpPr>
@@ -1692,8 +1692,8 @@
         </p:blipFill>
         <p:spPr>
           <a:xfrm>
-            <a:off x="771141" y="0"/>
-            <a:ext cx="9430517" cy="5486400"/>
+            <a:off x="144672" y="0"/>
+            <a:ext cx="10683456" cy="5486400"/>
           </a:xfrm>
           <a:prstGeom prst="rect">
             <a:avLst/>
@@ -1709,7 +1709,7 @@
 </file>
 
 <file path=ppt/slides/slide34.xml><?xml version="1.0" encoding="utf-8"?>
-<p:sld xmlns:a="http://schemas.openxmlformats.org/drawingml/2006/main" xmlns:p="http://schemas.openxmlformats.org/presentationml/2006/main" xmlns:r="http://schemas.openxmlformats.org/officeDocument/2006/relationships">
+<p:sld xmlns:p="http://schemas.openxmlformats.org/presentationml/2006/main" xmlns:a="http://schemas.openxmlformats.org/drawingml/2006/main" xmlns:r="http://schemas.openxmlformats.org/officeDocument/2006/relationships">
   <p:cSld>
     <p:spTree>
       <p:nvGrpSpPr>
@@ -1741,8 +1741,8 @@
         </p:blipFill>
         <p:spPr>
           <a:xfrm>
-            <a:off x="771141" y="0"/>
-            <a:ext cx="9430517" cy="5486400"/>
+            <a:off x="144672" y="0"/>
+            <a:ext cx="10683456" cy="5486400"/>
           </a:xfrm>
           <a:prstGeom prst="rect">
             <a:avLst/>
@@ -1758,7 +1758,7 @@
 </file>
 
 <file path=ppt/slides/slide35.xml><?xml version="1.0" encoding="utf-8"?>
-<p:sld xmlns:a="http://schemas.openxmlformats.org/drawingml/2006/main" xmlns:p="http://schemas.openxmlformats.org/presentationml/2006/main" xmlns:r="http://schemas.openxmlformats.org/officeDocument/2006/relationships">
+<p:sld xmlns:p="http://schemas.openxmlformats.org/presentationml/2006/main" xmlns:a="http://schemas.openxmlformats.org/drawingml/2006/main" xmlns:r="http://schemas.openxmlformats.org/officeDocument/2006/relationships">
   <p:cSld>
     <p:spTree>
       <p:nvGrpSpPr>
@@ -1790,8 +1790,8 @@
         </p:blipFill>
         <p:spPr>
           <a:xfrm>
-            <a:off x="771141" y="0"/>
-            <a:ext cx="9430517" cy="5486400"/>
+            <a:off x="144672" y="0"/>
+            <a:ext cx="10683456" cy="5486400"/>
           </a:xfrm>
           <a:prstGeom prst="rect">
             <a:avLst/>
@@ -1807,7 +1807,7 @@
 </file>
 
 <file path=ppt/slides/slide36.xml><?xml version="1.0" encoding="utf-8"?>
-<p:sld xmlns:a="http://schemas.openxmlformats.org/drawingml/2006/main" xmlns:p="http://schemas.openxmlformats.org/presentationml/2006/main" xmlns:r="http://schemas.openxmlformats.org/officeDocument/2006/relationships">
+<p:sld xmlns:p="http://schemas.openxmlformats.org/presentationml/2006/main" xmlns:a="http://schemas.openxmlformats.org/drawingml/2006/main" xmlns:r="http://schemas.openxmlformats.org/officeDocument/2006/relationships">
   <p:cSld>
     <p:spTree>
       <p:nvGrpSpPr>
@@ -1839,8 +1839,8 @@
         </p:blipFill>
         <p:spPr>
           <a:xfrm>
-            <a:off x="771141" y="0"/>
-            <a:ext cx="9430517" cy="5486400"/>
+            <a:off x="144672" y="0"/>
+            <a:ext cx="10683456" cy="5486400"/>
           </a:xfrm>
           <a:prstGeom prst="rect">
             <a:avLst/>
@@ -1856,7 +1856,7 @@
 </file>
 
 <file path=ppt/slides/slide37.xml><?xml version="1.0" encoding="utf-8"?>
-<p:sld xmlns:a="http://schemas.openxmlformats.org/drawingml/2006/main" xmlns:p="http://schemas.openxmlformats.org/presentationml/2006/main" xmlns:r="http://schemas.openxmlformats.org/officeDocument/2006/relationships">
+<p:sld xmlns:p="http://schemas.openxmlformats.org/presentationml/2006/main" xmlns:a="http://schemas.openxmlformats.org/drawingml/2006/main" xmlns:r="http://schemas.openxmlformats.org/officeDocument/2006/relationships">
   <p:cSld>
     <p:spTree>
       <p:nvGrpSpPr>
@@ -1888,8 +1888,8 @@
         </p:blipFill>
         <p:spPr>
           <a:xfrm>
-            <a:off x="771141" y="0"/>
-            <a:ext cx="9430517" cy="5486400"/>
+            <a:off x="144672" y="0"/>
+            <a:ext cx="10683456" cy="5486400"/>
           </a:xfrm>
           <a:prstGeom prst="rect">
             <a:avLst/>
@@ -1905,7 +1905,7 @@
 </file>
 
 <file path=ppt/slides/slide38.xml><?xml version="1.0" encoding="utf-8"?>
-<p:sld xmlns:a="http://schemas.openxmlformats.org/drawingml/2006/main" xmlns:p="http://schemas.openxmlformats.org/presentationml/2006/main" xmlns:r="http://schemas.openxmlformats.org/officeDocument/2006/relationships">
+<p:sld xmlns:p="http://schemas.openxmlformats.org/presentationml/2006/main" xmlns:a="http://schemas.openxmlformats.org/drawingml/2006/main" xmlns:r="http://schemas.openxmlformats.org/officeDocument/2006/relationships">
   <p:cSld>
     <p:spTree>
       <p:nvGrpSpPr>
@@ -1937,8 +1937,8 @@
         </p:blipFill>
         <p:spPr>
           <a:xfrm>
-            <a:off x="771141" y="0"/>
-            <a:ext cx="9430517" cy="5486400"/>
+            <a:off x="144672" y="0"/>
+            <a:ext cx="10683456" cy="5486400"/>
           </a:xfrm>
           <a:prstGeom prst="rect">
             <a:avLst/>
@@ -1954,7 +1954,7 @@
 </file>
 
 <file path=ppt/slides/slide39.xml><?xml version="1.0" encoding="utf-8"?>
-<p:sld xmlns:a="http://schemas.openxmlformats.org/drawingml/2006/main" xmlns:p="http://schemas.openxmlformats.org/presentationml/2006/main" xmlns:r="http://schemas.openxmlformats.org/officeDocument/2006/relationships">
+<p:sld xmlns:p="http://schemas.openxmlformats.org/presentationml/2006/main" xmlns:a="http://schemas.openxmlformats.org/drawingml/2006/main" xmlns:r="http://schemas.openxmlformats.org/officeDocument/2006/relationships">
   <p:cSld>
     <p:spTree>
       <p:nvGrpSpPr>
@@ -1986,8 +1986,8 @@
         </p:blipFill>
         <p:spPr>
           <a:xfrm>
-            <a:off x="771141" y="0"/>
-            <a:ext cx="9430517" cy="5486400"/>
+            <a:off x="144672" y="0"/>
+            <a:ext cx="10683456" cy="5486400"/>
           </a:xfrm>
           <a:prstGeom prst="rect">
             <a:avLst/>
@@ -2003,7 +2003,7 @@
 </file>
 
 <file path=ppt/slides/slide4.xml><?xml version="1.0" encoding="utf-8"?>
-<p:sld xmlns:a="http://schemas.openxmlformats.org/drawingml/2006/main" xmlns:p="http://schemas.openxmlformats.org/presentationml/2006/main" xmlns:r="http://schemas.openxmlformats.org/officeDocument/2006/relationships">
+<p:sld xmlns:p="http://schemas.openxmlformats.org/presentationml/2006/main" xmlns:a="http://schemas.openxmlformats.org/drawingml/2006/main" xmlns:r="http://schemas.openxmlformats.org/officeDocument/2006/relationships">
   <p:cSld>
     <p:spTree>
       <p:nvGrpSpPr>
@@ -2035,8 +2035,8 @@
         </p:blipFill>
         <p:spPr>
           <a:xfrm>
-            <a:off x="771141" y="0"/>
-            <a:ext cx="9430517" cy="5486400"/>
+            <a:off x="144672" y="0"/>
+            <a:ext cx="10683456" cy="5486400"/>
           </a:xfrm>
           <a:prstGeom prst="rect">
             <a:avLst/>
@@ -2052,7 +2052,7 @@
 </file>
 
 <file path=ppt/slides/slide40.xml><?xml version="1.0" encoding="utf-8"?>
-<p:sld xmlns:a="http://schemas.openxmlformats.org/drawingml/2006/main" xmlns:p="http://schemas.openxmlformats.org/presentationml/2006/main" xmlns:r="http://schemas.openxmlformats.org/officeDocument/2006/relationships">
+<p:sld xmlns:p="http://schemas.openxmlformats.org/presentationml/2006/main" xmlns:a="http://schemas.openxmlformats.org/drawingml/2006/main" xmlns:r="http://schemas.openxmlformats.org/officeDocument/2006/relationships">
   <p:cSld>
     <p:spTree>
       <p:nvGrpSpPr>
@@ -2084,8 +2084,8 @@
         </p:blipFill>
         <p:spPr>
           <a:xfrm>
-            <a:off x="771141" y="0"/>
-            <a:ext cx="9430517" cy="5486400"/>
+            <a:off x="144672" y="0"/>
+            <a:ext cx="10683456" cy="5486400"/>
           </a:xfrm>
           <a:prstGeom prst="rect">
             <a:avLst/>
@@ -2101,7 +2101,7 @@
 </file>
 
 <file path=ppt/slides/slide41.xml><?xml version="1.0" encoding="utf-8"?>
-<p:sld xmlns:a="http://schemas.openxmlformats.org/drawingml/2006/main" xmlns:p="http://schemas.openxmlformats.org/presentationml/2006/main" xmlns:r="http://schemas.openxmlformats.org/officeDocument/2006/relationships">
+<p:sld xmlns:p="http://schemas.openxmlformats.org/presentationml/2006/main" xmlns:a="http://schemas.openxmlformats.org/drawingml/2006/main" xmlns:r="http://schemas.openxmlformats.org/officeDocument/2006/relationships">
   <p:cSld>
     <p:spTree>
       <p:nvGrpSpPr>
@@ -2133,8 +2133,8 @@
         </p:blipFill>
         <p:spPr>
           <a:xfrm>
-            <a:off x="771141" y="0"/>
-            <a:ext cx="9430517" cy="5486400"/>
+            <a:off x="144672" y="0"/>
+            <a:ext cx="10683456" cy="5486400"/>
           </a:xfrm>
           <a:prstGeom prst="rect">
             <a:avLst/>
@@ -2150,7 +2150,7 @@
 </file>
 
 <file path=ppt/slides/slide42.xml><?xml version="1.0" encoding="utf-8"?>
-<p:sld xmlns:a="http://schemas.openxmlformats.org/drawingml/2006/main" xmlns:p="http://schemas.openxmlformats.org/presentationml/2006/main" xmlns:r="http://schemas.openxmlformats.org/officeDocument/2006/relationships">
+<p:sld xmlns:p="http://schemas.openxmlformats.org/presentationml/2006/main" xmlns:a="http://schemas.openxmlformats.org/drawingml/2006/main" xmlns:r="http://schemas.openxmlformats.org/officeDocument/2006/relationships">
   <p:cSld>
     <p:spTree>
       <p:nvGrpSpPr>
@@ -2182,8 +2182,8 @@
         </p:blipFill>
         <p:spPr>
           <a:xfrm>
-            <a:off x="771141" y="0"/>
-            <a:ext cx="9430517" cy="5486400"/>
+            <a:off x="144672" y="0"/>
+            <a:ext cx="10683456" cy="5486400"/>
           </a:xfrm>
           <a:prstGeom prst="rect">
             <a:avLst/>
@@ -2199,7 +2199,7 @@
 </file>
 
 <file path=ppt/slides/slide43.xml><?xml version="1.0" encoding="utf-8"?>
-<p:sld xmlns:a="http://schemas.openxmlformats.org/drawingml/2006/main" xmlns:p="http://schemas.openxmlformats.org/presentationml/2006/main" xmlns:r="http://schemas.openxmlformats.org/officeDocument/2006/relationships">
+<p:sld xmlns:p="http://schemas.openxmlformats.org/presentationml/2006/main" xmlns:a="http://schemas.openxmlformats.org/drawingml/2006/main" xmlns:r="http://schemas.openxmlformats.org/officeDocument/2006/relationships">
   <p:cSld>
     <p:spTree>
       <p:nvGrpSpPr>
@@ -2231,8 +2231,8 @@
         </p:blipFill>
         <p:spPr>
           <a:xfrm>
-            <a:off x="771141" y="0"/>
-            <a:ext cx="9430517" cy="5486400"/>
+            <a:off x="144672" y="0"/>
+            <a:ext cx="10683456" cy="5486400"/>
           </a:xfrm>
           <a:prstGeom prst="rect">
             <a:avLst/>
@@ -2248,7 +2248,7 @@
 </file>
 
 <file path=ppt/slides/slide44.xml><?xml version="1.0" encoding="utf-8"?>
-<p:sld xmlns:a="http://schemas.openxmlformats.org/drawingml/2006/main" xmlns:p="http://schemas.openxmlformats.org/presentationml/2006/main" xmlns:r="http://schemas.openxmlformats.org/officeDocument/2006/relationships">
+<p:sld xmlns:p="http://schemas.openxmlformats.org/presentationml/2006/main" xmlns:a="http://schemas.openxmlformats.org/drawingml/2006/main" xmlns:r="http://schemas.openxmlformats.org/officeDocument/2006/relationships">
   <p:cSld>
     <p:spTree>
       <p:nvGrpSpPr>
@@ -2280,8 +2280,8 @@
         </p:blipFill>
         <p:spPr>
           <a:xfrm>
-            <a:off x="771141" y="0"/>
-            <a:ext cx="9430517" cy="5486400"/>
+            <a:off x="144672" y="0"/>
+            <a:ext cx="10683456" cy="5486400"/>
           </a:xfrm>
           <a:prstGeom prst="rect">
             <a:avLst/>
@@ -2297,7 +2297,7 @@
 </file>
 
 <file path=ppt/slides/slide45.xml><?xml version="1.0" encoding="utf-8"?>
-<p:sld xmlns:a="http://schemas.openxmlformats.org/drawingml/2006/main" xmlns:p="http://schemas.openxmlformats.org/presentationml/2006/main" xmlns:r="http://schemas.openxmlformats.org/officeDocument/2006/relationships">
+<p:sld xmlns:p="http://schemas.openxmlformats.org/presentationml/2006/main" xmlns:a="http://schemas.openxmlformats.org/drawingml/2006/main" xmlns:r="http://schemas.openxmlformats.org/officeDocument/2006/relationships">
   <p:cSld>
     <p:spTree>
       <p:nvGrpSpPr>
@@ -2329,8 +2329,8 @@
         </p:blipFill>
         <p:spPr>
           <a:xfrm>
-            <a:off x="771141" y="0"/>
-            <a:ext cx="9430517" cy="5486400"/>
+            <a:off x="144672" y="0"/>
+            <a:ext cx="10683456" cy="5486400"/>
           </a:xfrm>
           <a:prstGeom prst="rect">
             <a:avLst/>
@@ -2346,7 +2346,7 @@
 </file>
 
 <file path=ppt/slides/slide46.xml><?xml version="1.0" encoding="utf-8"?>
-<p:sld xmlns:a="http://schemas.openxmlformats.org/drawingml/2006/main" xmlns:p="http://schemas.openxmlformats.org/presentationml/2006/main" xmlns:r="http://schemas.openxmlformats.org/officeDocument/2006/relationships">
+<p:sld xmlns:p="http://schemas.openxmlformats.org/presentationml/2006/main" xmlns:a="http://schemas.openxmlformats.org/drawingml/2006/main" xmlns:r="http://schemas.openxmlformats.org/officeDocument/2006/relationships">
   <p:cSld>
     <p:spTree>
       <p:nvGrpSpPr>
@@ -2378,8 +2378,8 @@
         </p:blipFill>
         <p:spPr>
           <a:xfrm>
-            <a:off x="771141" y="0"/>
-            <a:ext cx="9430517" cy="5486400"/>
+            <a:off x="144672" y="0"/>
+            <a:ext cx="10683456" cy="5486400"/>
           </a:xfrm>
           <a:prstGeom prst="rect">
             <a:avLst/>
@@ -2395,7 +2395,7 @@
 </file>
 
 <file path=ppt/slides/slide47.xml><?xml version="1.0" encoding="utf-8"?>
-<p:sld xmlns:a="http://schemas.openxmlformats.org/drawingml/2006/main" xmlns:p="http://schemas.openxmlformats.org/presentationml/2006/main" xmlns:r="http://schemas.openxmlformats.org/officeDocument/2006/relationships">
+<p:sld xmlns:p="http://schemas.openxmlformats.org/presentationml/2006/main" xmlns:a="http://schemas.openxmlformats.org/drawingml/2006/main" xmlns:r="http://schemas.openxmlformats.org/officeDocument/2006/relationships">
   <p:cSld>
     <p:spTree>
       <p:nvGrpSpPr>
@@ -2427,8 +2427,8 @@
         </p:blipFill>
         <p:spPr>
           <a:xfrm>
-            <a:off x="771141" y="0"/>
-            <a:ext cx="9430517" cy="5486400"/>
+            <a:off x="144672" y="0"/>
+            <a:ext cx="10683456" cy="5486400"/>
           </a:xfrm>
           <a:prstGeom prst="rect">
             <a:avLst/>
@@ -2444,7 +2444,7 @@
 </file>
 
 <file path=ppt/slides/slide48.xml><?xml version="1.0" encoding="utf-8"?>
-<p:sld xmlns:a="http://schemas.openxmlformats.org/drawingml/2006/main" xmlns:p="http://schemas.openxmlformats.org/presentationml/2006/main" xmlns:r="http://schemas.openxmlformats.org/officeDocument/2006/relationships">
+<p:sld xmlns:p="http://schemas.openxmlformats.org/presentationml/2006/main" xmlns:a="http://schemas.openxmlformats.org/drawingml/2006/main" xmlns:r="http://schemas.openxmlformats.org/officeDocument/2006/relationships">
   <p:cSld>
     <p:spTree>
       <p:nvGrpSpPr>
@@ -2476,8 +2476,8 @@
         </p:blipFill>
         <p:spPr>
           <a:xfrm>
-            <a:off x="771141" y="0"/>
-            <a:ext cx="9430517" cy="5486400"/>
+            <a:off x="144672" y="0"/>
+            <a:ext cx="10683456" cy="5486400"/>
           </a:xfrm>
           <a:prstGeom prst="rect">
             <a:avLst/>
@@ -2493,7 +2493,7 @@
 </file>
 
 <file path=ppt/slides/slide49.xml><?xml version="1.0" encoding="utf-8"?>
-<p:sld xmlns:a="http://schemas.openxmlformats.org/drawingml/2006/main" xmlns:p="http://schemas.openxmlformats.org/presentationml/2006/main" xmlns:r="http://schemas.openxmlformats.org/officeDocument/2006/relationships">
+<p:sld xmlns:p="http://schemas.openxmlformats.org/presentationml/2006/main" xmlns:a="http://schemas.openxmlformats.org/drawingml/2006/main" xmlns:r="http://schemas.openxmlformats.org/officeDocument/2006/relationships">
   <p:cSld>
     <p:spTree>
       <p:nvGrpSpPr>
@@ -2525,8 +2525,8 @@
         </p:blipFill>
         <p:spPr>
           <a:xfrm>
-            <a:off x="771141" y="0"/>
-            <a:ext cx="9430517" cy="5486400"/>
+            <a:off x="144672" y="0"/>
+            <a:ext cx="10683456" cy="5486400"/>
           </a:xfrm>
           <a:prstGeom prst="rect">
             <a:avLst/>
@@ -2542,7 +2542,7 @@
 </file>
 
 <file path=ppt/slides/slide5.xml><?xml version="1.0" encoding="utf-8"?>
-<p:sld xmlns:a="http://schemas.openxmlformats.org/drawingml/2006/main" xmlns:p="http://schemas.openxmlformats.org/presentationml/2006/main" xmlns:r="http://schemas.openxmlformats.org/officeDocument/2006/relationships">
+<p:sld xmlns:p="http://schemas.openxmlformats.org/presentationml/2006/main" xmlns:a="http://schemas.openxmlformats.org/drawingml/2006/main" xmlns:r="http://schemas.openxmlformats.org/officeDocument/2006/relationships">
   <p:cSld>
     <p:spTree>
       <p:nvGrpSpPr>
@@ -2574,8 +2574,8 @@
         </p:blipFill>
         <p:spPr>
           <a:xfrm>
-            <a:off x="771141" y="0"/>
-            <a:ext cx="9430517" cy="5486400"/>
+            <a:off x="144672" y="0"/>
+            <a:ext cx="10683456" cy="5486400"/>
           </a:xfrm>
           <a:prstGeom prst="rect">
             <a:avLst/>
@@ -2591,7 +2591,7 @@
 </file>
 
 <file path=ppt/slides/slide50.xml><?xml version="1.0" encoding="utf-8"?>
-<p:sld xmlns:a="http://schemas.openxmlformats.org/drawingml/2006/main" xmlns:p="http://schemas.openxmlformats.org/presentationml/2006/main" xmlns:r="http://schemas.openxmlformats.org/officeDocument/2006/relationships">
+<p:sld xmlns:p="http://schemas.openxmlformats.org/presentationml/2006/main" xmlns:a="http://schemas.openxmlformats.org/drawingml/2006/main" xmlns:r="http://schemas.openxmlformats.org/officeDocument/2006/relationships">
   <p:cSld>
     <p:spTree>
       <p:nvGrpSpPr>
@@ -2623,8 +2623,8 @@
         </p:blipFill>
         <p:spPr>
           <a:xfrm>
-            <a:off x="771141" y="0"/>
-            <a:ext cx="9430517" cy="5486400"/>
+            <a:off x="144672" y="0"/>
+            <a:ext cx="10683456" cy="5486400"/>
           </a:xfrm>
           <a:prstGeom prst="rect">
             <a:avLst/>
@@ -2640,7 +2640,7 @@
 </file>
 
 <file path=ppt/slides/slide51.xml><?xml version="1.0" encoding="utf-8"?>
-<p:sld xmlns:a="http://schemas.openxmlformats.org/drawingml/2006/main" xmlns:p="http://schemas.openxmlformats.org/presentationml/2006/main" xmlns:r="http://schemas.openxmlformats.org/officeDocument/2006/relationships">
+<p:sld xmlns:p="http://schemas.openxmlformats.org/presentationml/2006/main" xmlns:a="http://schemas.openxmlformats.org/drawingml/2006/main" xmlns:r="http://schemas.openxmlformats.org/officeDocument/2006/relationships">
   <p:cSld>
     <p:spTree>
       <p:nvGrpSpPr>
@@ -2672,8 +2672,8 @@
         </p:blipFill>
         <p:spPr>
           <a:xfrm>
-            <a:off x="771141" y="0"/>
-            <a:ext cx="9430517" cy="5486400"/>
+            <a:off x="144672" y="0"/>
+            <a:ext cx="10683456" cy="5486400"/>
           </a:xfrm>
           <a:prstGeom prst="rect">
             <a:avLst/>
@@ -2689,7 +2689,7 @@
 </file>
 
 <file path=ppt/slides/slide52.xml><?xml version="1.0" encoding="utf-8"?>
-<p:sld xmlns:a="http://schemas.openxmlformats.org/drawingml/2006/main" xmlns:p="http://schemas.openxmlformats.org/presentationml/2006/main" xmlns:r="http://schemas.openxmlformats.org/officeDocument/2006/relationships">
+<p:sld xmlns:p="http://schemas.openxmlformats.org/presentationml/2006/main" xmlns:a="http://schemas.openxmlformats.org/drawingml/2006/main" xmlns:r="http://schemas.openxmlformats.org/officeDocument/2006/relationships">
   <p:cSld>
     <p:spTree>
       <p:nvGrpSpPr>
@@ -2721,8 +2721,8 @@
         </p:blipFill>
         <p:spPr>
           <a:xfrm>
-            <a:off x="771141" y="0"/>
-            <a:ext cx="9430517" cy="5486400"/>
+            <a:off x="144672" y="0"/>
+            <a:ext cx="10683456" cy="5486400"/>
           </a:xfrm>
           <a:prstGeom prst="rect">
             <a:avLst/>
@@ -2738,7 +2738,7 @@
 </file>
 
 <file path=ppt/slides/slide53.xml><?xml version="1.0" encoding="utf-8"?>
-<p:sld xmlns:a="http://schemas.openxmlformats.org/drawingml/2006/main" xmlns:p="http://schemas.openxmlformats.org/presentationml/2006/main" xmlns:r="http://schemas.openxmlformats.org/officeDocument/2006/relationships">
+<p:sld xmlns:p="http://schemas.openxmlformats.org/presentationml/2006/main" xmlns:a="http://schemas.openxmlformats.org/drawingml/2006/main" xmlns:r="http://schemas.openxmlformats.org/officeDocument/2006/relationships">
   <p:cSld>
     <p:spTree>
       <p:nvGrpSpPr>
@@ -2770,8 +2770,8 @@
         </p:blipFill>
         <p:spPr>
           <a:xfrm>
-            <a:off x="771141" y="0"/>
-            <a:ext cx="9430517" cy="5486400"/>
+            <a:off x="144672" y="0"/>
+            <a:ext cx="10683456" cy="5486400"/>
           </a:xfrm>
           <a:prstGeom prst="rect">
             <a:avLst/>
@@ -2787,7 +2787,7 @@
 </file>
 
 <file path=ppt/slides/slide54.xml><?xml version="1.0" encoding="utf-8"?>
-<p:sld xmlns:a="http://schemas.openxmlformats.org/drawingml/2006/main" xmlns:p="http://schemas.openxmlformats.org/presentationml/2006/main" xmlns:r="http://schemas.openxmlformats.org/officeDocument/2006/relationships">
+<p:sld xmlns:p="http://schemas.openxmlformats.org/presentationml/2006/main" xmlns:a="http://schemas.openxmlformats.org/drawingml/2006/main" xmlns:r="http://schemas.openxmlformats.org/officeDocument/2006/relationships">
   <p:cSld>
     <p:spTree>
       <p:nvGrpSpPr>
@@ -2819,8 +2819,8 @@
         </p:blipFill>
         <p:spPr>
           <a:xfrm>
-            <a:off x="771141" y="0"/>
-            <a:ext cx="9430517" cy="5486400"/>
+            <a:off x="144672" y="0"/>
+            <a:ext cx="10683456" cy="5486400"/>
           </a:xfrm>
           <a:prstGeom prst="rect">
             <a:avLst/>
@@ -2836,7 +2836,7 @@
 </file>
 
 <file path=ppt/slides/slide55.xml><?xml version="1.0" encoding="utf-8"?>
-<p:sld xmlns:a="http://schemas.openxmlformats.org/drawingml/2006/main" xmlns:p="http://schemas.openxmlformats.org/presentationml/2006/main" xmlns:r="http://schemas.openxmlformats.org/officeDocument/2006/relationships">
+<p:sld xmlns:p="http://schemas.openxmlformats.org/presentationml/2006/main" xmlns:a="http://schemas.openxmlformats.org/drawingml/2006/main" xmlns:r="http://schemas.openxmlformats.org/officeDocument/2006/relationships">
   <p:cSld>
     <p:spTree>
       <p:nvGrpSpPr>
@@ -2868,8 +2868,8 @@
         </p:blipFill>
         <p:spPr>
           <a:xfrm>
-            <a:off x="771141" y="0"/>
-            <a:ext cx="9430517" cy="5486400"/>
+            <a:off x="144672" y="0"/>
+            <a:ext cx="10683456" cy="5486400"/>
           </a:xfrm>
           <a:prstGeom prst="rect">
             <a:avLst/>
@@ -2885,7 +2885,7 @@
 </file>
 
 <file path=ppt/slides/slide56.xml><?xml version="1.0" encoding="utf-8"?>
-<p:sld xmlns:a="http://schemas.openxmlformats.org/drawingml/2006/main" xmlns:p="http://schemas.openxmlformats.org/presentationml/2006/main" xmlns:r="http://schemas.openxmlformats.org/officeDocument/2006/relationships">
+<p:sld xmlns:p="http://schemas.openxmlformats.org/presentationml/2006/main" xmlns:a="http://schemas.openxmlformats.org/drawingml/2006/main" xmlns:r="http://schemas.openxmlformats.org/officeDocument/2006/relationships">
   <p:cSld>
     <p:spTree>
       <p:nvGrpSpPr>
@@ -2917,8 +2917,8 @@
         </p:blipFill>
         <p:spPr>
           <a:xfrm>
-            <a:off x="771141" y="0"/>
-            <a:ext cx="9430517" cy="5486400"/>
+            <a:off x="144672" y="0"/>
+            <a:ext cx="10683456" cy="5486400"/>
           </a:xfrm>
           <a:prstGeom prst="rect">
             <a:avLst/>
@@ -2934,7 +2934,7 @@
 </file>
 
 <file path=ppt/slides/slide57.xml><?xml version="1.0" encoding="utf-8"?>
-<p:sld xmlns:a="http://schemas.openxmlformats.org/drawingml/2006/main" xmlns:p="http://schemas.openxmlformats.org/presentationml/2006/main" xmlns:r="http://schemas.openxmlformats.org/officeDocument/2006/relationships">
+<p:sld xmlns:p="http://schemas.openxmlformats.org/presentationml/2006/main" xmlns:a="http://schemas.openxmlformats.org/drawingml/2006/main" xmlns:r="http://schemas.openxmlformats.org/officeDocument/2006/relationships">
   <p:cSld>
     <p:spTree>
       <p:nvGrpSpPr>
@@ -2966,8 +2966,8 @@
         </p:blipFill>
         <p:spPr>
           <a:xfrm>
-            <a:off x="771141" y="0"/>
-            <a:ext cx="9430517" cy="5486400"/>
+            <a:off x="144672" y="0"/>
+            <a:ext cx="10683456" cy="5486400"/>
           </a:xfrm>
           <a:prstGeom prst="rect">
             <a:avLst/>
@@ -2983,7 +2983,7 @@
 </file>
 
 <file path=ppt/slides/slide58.xml><?xml version="1.0" encoding="utf-8"?>
-<p:sld xmlns:a="http://schemas.openxmlformats.org/drawingml/2006/main" xmlns:p="http://schemas.openxmlformats.org/presentationml/2006/main" xmlns:r="http://schemas.openxmlformats.org/officeDocument/2006/relationships">
+<p:sld xmlns:p="http://schemas.openxmlformats.org/presentationml/2006/main" xmlns:a="http://schemas.openxmlformats.org/drawingml/2006/main" xmlns:r="http://schemas.openxmlformats.org/officeDocument/2006/relationships">
   <p:cSld>
     <p:spTree>
       <p:nvGrpSpPr>
@@ -3015,8 +3015,8 @@
         </p:blipFill>
         <p:spPr>
           <a:xfrm>
-            <a:off x="771141" y="0"/>
-            <a:ext cx="9430517" cy="5486400"/>
+            <a:off x="144672" y="0"/>
+            <a:ext cx="10683456" cy="5486400"/>
           </a:xfrm>
           <a:prstGeom prst="rect">
             <a:avLst/>
@@ -3032,7 +3032,7 @@
 </file>
 
 <file path=ppt/slides/slide59.xml><?xml version="1.0" encoding="utf-8"?>
-<p:sld xmlns:a="http://schemas.openxmlformats.org/drawingml/2006/main" xmlns:p="http://schemas.openxmlformats.org/presentationml/2006/main" xmlns:r="http://schemas.openxmlformats.org/officeDocument/2006/relationships">
+<p:sld xmlns:p="http://schemas.openxmlformats.org/presentationml/2006/main" xmlns:a="http://schemas.openxmlformats.org/drawingml/2006/main" xmlns:r="http://schemas.openxmlformats.org/officeDocument/2006/relationships">
   <p:cSld>
     <p:spTree>
       <p:nvGrpSpPr>
@@ -3064,8 +3064,8 @@
         </p:blipFill>
         <p:spPr>
           <a:xfrm>
-            <a:off x="771141" y="0"/>
-            <a:ext cx="9430517" cy="5486400"/>
+            <a:off x="144672" y="0"/>
+            <a:ext cx="10683456" cy="5486400"/>
           </a:xfrm>
           <a:prstGeom prst="rect">
             <a:avLst/>
@@ -3081,7 +3081,7 @@
 </file>
 
 <file path=ppt/slides/slide6.xml><?xml version="1.0" encoding="utf-8"?>
-<p:sld xmlns:a="http://schemas.openxmlformats.org/drawingml/2006/main" xmlns:p="http://schemas.openxmlformats.org/presentationml/2006/main" xmlns:r="http://schemas.openxmlformats.org/officeDocument/2006/relationships">
+<p:sld xmlns:p="http://schemas.openxmlformats.org/presentationml/2006/main" xmlns:a="http://schemas.openxmlformats.org/drawingml/2006/main" xmlns:r="http://schemas.openxmlformats.org/officeDocument/2006/relationships">
   <p:cSld>
     <p:spTree>
       <p:nvGrpSpPr>
@@ -3113,8 +3113,8 @@
         </p:blipFill>
         <p:spPr>
           <a:xfrm>
-            <a:off x="771141" y="0"/>
-            <a:ext cx="9430517" cy="5486400"/>
+            <a:off x="144672" y="0"/>
+            <a:ext cx="10683456" cy="5486400"/>
           </a:xfrm>
           <a:prstGeom prst="rect">
             <a:avLst/>
@@ -3130,7 +3130,7 @@
 </file>
 
 <file path=ppt/slides/slide60.xml><?xml version="1.0" encoding="utf-8"?>
-<p:sld xmlns:a="http://schemas.openxmlformats.org/drawingml/2006/main" xmlns:p="http://schemas.openxmlformats.org/presentationml/2006/main" xmlns:r="http://schemas.openxmlformats.org/officeDocument/2006/relationships">
+<p:sld xmlns:p="http://schemas.openxmlformats.org/presentationml/2006/main" xmlns:a="http://schemas.openxmlformats.org/drawingml/2006/main" xmlns:r="http://schemas.openxmlformats.org/officeDocument/2006/relationships">
   <p:cSld>
     <p:spTree>
       <p:nvGrpSpPr>
@@ -3162,8 +3162,8 @@
         </p:blipFill>
         <p:spPr>
           <a:xfrm>
-            <a:off x="771141" y="0"/>
-            <a:ext cx="9430517" cy="5486400"/>
+            <a:off x="144672" y="0"/>
+            <a:ext cx="10683456" cy="5486400"/>
           </a:xfrm>
           <a:prstGeom prst="rect">
             <a:avLst/>
@@ -3179,7 +3179,7 @@
 </file>
 
 <file path=ppt/slides/slide7.xml><?xml version="1.0" encoding="utf-8"?>
-<p:sld xmlns:a="http://schemas.openxmlformats.org/drawingml/2006/main" xmlns:p="http://schemas.openxmlformats.org/presentationml/2006/main" xmlns:r="http://schemas.openxmlformats.org/officeDocument/2006/relationships">
+<p:sld xmlns:p="http://schemas.openxmlformats.org/presentationml/2006/main" xmlns:a="http://schemas.openxmlformats.org/drawingml/2006/main" xmlns:r="http://schemas.openxmlformats.org/officeDocument/2006/relationships">
   <p:cSld>
     <p:spTree>
       <p:nvGrpSpPr>
@@ -3211,8 +3211,8 @@
         </p:blipFill>
         <p:spPr>
           <a:xfrm>
-            <a:off x="771141" y="0"/>
-            <a:ext cx="9430517" cy="5486400"/>
+            <a:off x="144672" y="0"/>
+            <a:ext cx="10683456" cy="5486400"/>
           </a:xfrm>
           <a:prstGeom prst="rect">
             <a:avLst/>
@@ -3228,7 +3228,7 @@
 </file>
 
 <file path=ppt/slides/slide8.xml><?xml version="1.0" encoding="utf-8"?>
-<p:sld xmlns:a="http://schemas.openxmlformats.org/drawingml/2006/main" xmlns:p="http://schemas.openxmlformats.org/presentationml/2006/main" xmlns:r="http://schemas.openxmlformats.org/officeDocument/2006/relationships">
+<p:sld xmlns:p="http://schemas.openxmlformats.org/presentationml/2006/main" xmlns:a="http://schemas.openxmlformats.org/drawingml/2006/main" xmlns:r="http://schemas.openxmlformats.org/officeDocument/2006/relationships">
   <p:cSld>
     <p:spTree>
       <p:nvGrpSpPr>
@@ -3260,8 +3260,8 @@
         </p:blipFill>
         <p:spPr>
           <a:xfrm>
-            <a:off x="771141" y="0"/>
-            <a:ext cx="9430517" cy="5486400"/>
+            <a:off x="144672" y="0"/>
+            <a:ext cx="10683456" cy="5486400"/>
           </a:xfrm>
           <a:prstGeom prst="rect">
             <a:avLst/>
@@ -3277,7 +3277,7 @@
 </file>
 
 <file path=ppt/slides/slide9.xml><?xml version="1.0" encoding="utf-8"?>
-<p:sld xmlns:a="http://schemas.openxmlformats.org/drawingml/2006/main" xmlns:p="http://schemas.openxmlformats.org/presentationml/2006/main" xmlns:r="http://schemas.openxmlformats.org/officeDocument/2006/relationships">
+<p:sld xmlns:p="http://schemas.openxmlformats.org/presentationml/2006/main" xmlns:a="http://schemas.openxmlformats.org/drawingml/2006/main" xmlns:r="http://schemas.openxmlformats.org/officeDocument/2006/relationships">
   <p:cSld>
     <p:spTree>
       <p:nvGrpSpPr>
@@ -3309,8 +3309,8 @@
         </p:blipFill>
         <p:spPr>
           <a:xfrm>
-            <a:off x="771141" y="0"/>
-            <a:ext cx="9430517" cy="5486400"/>
+            <a:off x="144672" y="0"/>
+            <a:ext cx="10683456" cy="5486400"/>
           </a:xfrm>
           <a:prstGeom prst="rect">
             <a:avLst/>

</xml_diff>

<commit_message>
checkpoint - crawler function
I've updated the crawler function so that now it will find the onset better (it may lie before the light pulse by a few ms). To see if a spike is light-triggered, I check to see if the peak of the spike comes after the light pulse).

Default use 3 s of context when searching for the offset of the spike
</commit_message>
<xml_diff>
--- a/troubleshooting.pptx
+++ b/troubleshooting.pptx
@@ -20,6 +20,25 @@
     <p:sldId id="265" r:id="rId16"/>
     <p:sldId id="266" r:id="rId17"/>
     <p:sldId id="267" r:id="rId18"/>
+    <p:sldId id="268" r:id="rId19"/>
+    <p:sldId id="269" r:id="rId20"/>
+    <p:sldId id="270" r:id="rId21"/>
+    <p:sldId id="271" r:id="rId22"/>
+    <p:sldId id="272" r:id="rId23"/>
+    <p:sldId id="273" r:id="rId24"/>
+    <p:sldId id="274" r:id="rId25"/>
+    <p:sldId id="275" r:id="rId26"/>
+    <p:sldId id="276" r:id="rId27"/>
+    <p:sldId id="277" r:id="rId28"/>
+    <p:sldId id="278" r:id="rId29"/>
+    <p:sldId id="279" r:id="rId30"/>
+    <p:sldId id="280" r:id="rId31"/>
+    <p:sldId id="281" r:id="rId32"/>
+    <p:sldId id="282" r:id="rId33"/>
+    <p:sldId id="283" r:id="rId34"/>
+    <p:sldId id="284" r:id="rId35"/>
+    <p:sldId id="285" r:id="rId36"/>
+    <p:sldId id="286" r:id="rId37"/>
   </p:sldIdLst>
   <p:sldSz cx="10972800" cy="5486400" type="screen4x3"/>
   <p:notesSz cx="10972800" cy="5486400"/>
@@ -383,6 +402,349 @@
 </p:sld>
 </file>
 
+<file path=ppt/slides/slide13.xml><?xml version="1.0" encoding="utf-8"?>
+<p:sld xmlns:p="http://schemas.openxmlformats.org/presentationml/2006/main" xmlns:a="http://schemas.openxmlformats.org/drawingml/2006/main" xmlns:r="http://schemas.openxmlformats.org/officeDocument/2006/relationships">
+  <p:cSld>
+    <p:spTree>
+      <p:nvGrpSpPr>
+        <p:cNvPr id="1" name=""/>
+        <p:cNvGrpSpPr/>
+        <p:nvPr/>
+      </p:nvGrpSpPr>
+      <p:grpSpPr>
+        <a:xfrm>
+          <a:off x="0" y="0"/>
+          <a:ext cx="0" cy="0"/>
+          <a:chOff x="0" y="0"/>
+          <a:chExt cx="0" cy="0"/>
+        </a:xfrm>
+      </p:grpSpPr>
+      <p:pic>
+        <p:nvPicPr>
+          <p:cNvPr descr="image-13-2.png" id="2" name="Media File"/>
+          <p:cNvPicPr>
+            <a:picLocks noChangeAspect="1"/>
+          </p:cNvPicPr>
+          <p:nvPr/>
+        </p:nvPicPr>
+        <p:blipFill>
+          <a:blip cstate="print" r:embed="rId2"/>
+          <a:stretch>
+            <a:fillRect/>
+          </a:stretch>
+        </p:blipFill>
+        <p:spPr>
+          <a:xfrm>
+            <a:off x="144672" y="0"/>
+            <a:ext cx="10683456" cy="5486400"/>
+          </a:xfrm>
+          <a:prstGeom prst="rect">
+            <a:avLst/>
+          </a:prstGeom>
+        </p:spPr>
+      </p:pic>
+    </p:spTree>
+  </p:cSld>
+  <p:clrMapOvr>
+    <a:masterClrMapping/>
+  </p:clrMapOvr>
+</p:sld>
+</file>
+
+<file path=ppt/slides/slide14.xml><?xml version="1.0" encoding="utf-8"?>
+<p:sld xmlns:p="http://schemas.openxmlformats.org/presentationml/2006/main" xmlns:a="http://schemas.openxmlformats.org/drawingml/2006/main" xmlns:r="http://schemas.openxmlformats.org/officeDocument/2006/relationships">
+  <p:cSld>
+    <p:spTree>
+      <p:nvGrpSpPr>
+        <p:cNvPr id="1" name=""/>
+        <p:cNvGrpSpPr/>
+        <p:nvPr/>
+      </p:nvGrpSpPr>
+      <p:grpSpPr>
+        <a:xfrm>
+          <a:off x="0" y="0"/>
+          <a:ext cx="0" cy="0"/>
+          <a:chOff x="0" y="0"/>
+          <a:chExt cx="0" cy="0"/>
+        </a:xfrm>
+      </p:grpSpPr>
+      <p:pic>
+        <p:nvPicPr>
+          <p:cNvPr descr="image-14-2.png" id="2" name="Media File"/>
+          <p:cNvPicPr>
+            <a:picLocks noChangeAspect="1"/>
+          </p:cNvPicPr>
+          <p:nvPr/>
+        </p:nvPicPr>
+        <p:blipFill>
+          <a:blip cstate="print" r:embed="rId2"/>
+          <a:stretch>
+            <a:fillRect/>
+          </a:stretch>
+        </p:blipFill>
+        <p:spPr>
+          <a:xfrm>
+            <a:off x="144672" y="0"/>
+            <a:ext cx="10683456" cy="5486400"/>
+          </a:xfrm>
+          <a:prstGeom prst="rect">
+            <a:avLst/>
+          </a:prstGeom>
+        </p:spPr>
+      </p:pic>
+    </p:spTree>
+  </p:cSld>
+  <p:clrMapOvr>
+    <a:masterClrMapping/>
+  </p:clrMapOvr>
+</p:sld>
+</file>
+
+<file path=ppt/slides/slide15.xml><?xml version="1.0" encoding="utf-8"?>
+<p:sld xmlns:p="http://schemas.openxmlformats.org/presentationml/2006/main" xmlns:a="http://schemas.openxmlformats.org/drawingml/2006/main" xmlns:r="http://schemas.openxmlformats.org/officeDocument/2006/relationships">
+  <p:cSld>
+    <p:spTree>
+      <p:nvGrpSpPr>
+        <p:cNvPr id="1" name=""/>
+        <p:cNvGrpSpPr/>
+        <p:nvPr/>
+      </p:nvGrpSpPr>
+      <p:grpSpPr>
+        <a:xfrm>
+          <a:off x="0" y="0"/>
+          <a:ext cx="0" cy="0"/>
+          <a:chOff x="0" y="0"/>
+          <a:chExt cx="0" cy="0"/>
+        </a:xfrm>
+      </p:grpSpPr>
+      <p:pic>
+        <p:nvPicPr>
+          <p:cNvPr descr="image-15-2.png" id="2" name="Media File"/>
+          <p:cNvPicPr>
+            <a:picLocks noChangeAspect="1"/>
+          </p:cNvPicPr>
+          <p:nvPr/>
+        </p:nvPicPr>
+        <p:blipFill>
+          <a:blip cstate="print" r:embed="rId2"/>
+          <a:stretch>
+            <a:fillRect/>
+          </a:stretch>
+        </p:blipFill>
+        <p:spPr>
+          <a:xfrm>
+            <a:off x="144672" y="0"/>
+            <a:ext cx="10683456" cy="5486400"/>
+          </a:xfrm>
+          <a:prstGeom prst="rect">
+            <a:avLst/>
+          </a:prstGeom>
+        </p:spPr>
+      </p:pic>
+    </p:spTree>
+  </p:cSld>
+  <p:clrMapOvr>
+    <a:masterClrMapping/>
+  </p:clrMapOvr>
+</p:sld>
+</file>
+
+<file path=ppt/slides/slide16.xml><?xml version="1.0" encoding="utf-8"?>
+<p:sld xmlns:p="http://schemas.openxmlformats.org/presentationml/2006/main" xmlns:a="http://schemas.openxmlformats.org/drawingml/2006/main" xmlns:r="http://schemas.openxmlformats.org/officeDocument/2006/relationships">
+  <p:cSld>
+    <p:spTree>
+      <p:nvGrpSpPr>
+        <p:cNvPr id="1" name=""/>
+        <p:cNvGrpSpPr/>
+        <p:nvPr/>
+      </p:nvGrpSpPr>
+      <p:grpSpPr>
+        <a:xfrm>
+          <a:off x="0" y="0"/>
+          <a:ext cx="0" cy="0"/>
+          <a:chOff x="0" y="0"/>
+          <a:chExt cx="0" cy="0"/>
+        </a:xfrm>
+      </p:grpSpPr>
+      <p:pic>
+        <p:nvPicPr>
+          <p:cNvPr descr="image-16-2.png" id="2" name="Media File"/>
+          <p:cNvPicPr>
+            <a:picLocks noChangeAspect="1"/>
+          </p:cNvPicPr>
+          <p:nvPr/>
+        </p:nvPicPr>
+        <p:blipFill>
+          <a:blip cstate="print" r:embed="rId2"/>
+          <a:stretch>
+            <a:fillRect/>
+          </a:stretch>
+        </p:blipFill>
+        <p:spPr>
+          <a:xfrm>
+            <a:off x="144672" y="0"/>
+            <a:ext cx="10683456" cy="5486400"/>
+          </a:xfrm>
+          <a:prstGeom prst="rect">
+            <a:avLst/>
+          </a:prstGeom>
+        </p:spPr>
+      </p:pic>
+    </p:spTree>
+  </p:cSld>
+  <p:clrMapOvr>
+    <a:masterClrMapping/>
+  </p:clrMapOvr>
+</p:sld>
+</file>
+
+<file path=ppt/slides/slide17.xml><?xml version="1.0" encoding="utf-8"?>
+<p:sld xmlns:p="http://schemas.openxmlformats.org/presentationml/2006/main" xmlns:a="http://schemas.openxmlformats.org/drawingml/2006/main" xmlns:r="http://schemas.openxmlformats.org/officeDocument/2006/relationships">
+  <p:cSld>
+    <p:spTree>
+      <p:nvGrpSpPr>
+        <p:cNvPr id="1" name=""/>
+        <p:cNvGrpSpPr/>
+        <p:nvPr/>
+      </p:nvGrpSpPr>
+      <p:grpSpPr>
+        <a:xfrm>
+          <a:off x="0" y="0"/>
+          <a:ext cx="0" cy="0"/>
+          <a:chOff x="0" y="0"/>
+          <a:chExt cx="0" cy="0"/>
+        </a:xfrm>
+      </p:grpSpPr>
+      <p:pic>
+        <p:nvPicPr>
+          <p:cNvPr descr="image-17-2.png" id="2" name="Media File"/>
+          <p:cNvPicPr>
+            <a:picLocks noChangeAspect="1"/>
+          </p:cNvPicPr>
+          <p:nvPr/>
+        </p:nvPicPr>
+        <p:blipFill>
+          <a:blip cstate="print" r:embed="rId2"/>
+          <a:stretch>
+            <a:fillRect/>
+          </a:stretch>
+        </p:blipFill>
+        <p:spPr>
+          <a:xfrm>
+            <a:off x="144672" y="0"/>
+            <a:ext cx="10683456" cy="5486400"/>
+          </a:xfrm>
+          <a:prstGeom prst="rect">
+            <a:avLst/>
+          </a:prstGeom>
+        </p:spPr>
+      </p:pic>
+    </p:spTree>
+  </p:cSld>
+  <p:clrMapOvr>
+    <a:masterClrMapping/>
+  </p:clrMapOvr>
+</p:sld>
+</file>
+
+<file path=ppt/slides/slide18.xml><?xml version="1.0" encoding="utf-8"?>
+<p:sld xmlns:p="http://schemas.openxmlformats.org/presentationml/2006/main" xmlns:a="http://schemas.openxmlformats.org/drawingml/2006/main" xmlns:r="http://schemas.openxmlformats.org/officeDocument/2006/relationships">
+  <p:cSld>
+    <p:spTree>
+      <p:nvGrpSpPr>
+        <p:cNvPr id="1" name=""/>
+        <p:cNvGrpSpPr/>
+        <p:nvPr/>
+      </p:nvGrpSpPr>
+      <p:grpSpPr>
+        <a:xfrm>
+          <a:off x="0" y="0"/>
+          <a:ext cx="0" cy="0"/>
+          <a:chOff x="0" y="0"/>
+          <a:chExt cx="0" cy="0"/>
+        </a:xfrm>
+      </p:grpSpPr>
+      <p:pic>
+        <p:nvPicPr>
+          <p:cNvPr descr="image-18-2.png" id="2" name="Media File"/>
+          <p:cNvPicPr>
+            <a:picLocks noChangeAspect="1"/>
+          </p:cNvPicPr>
+          <p:nvPr/>
+        </p:nvPicPr>
+        <p:blipFill>
+          <a:blip cstate="print" r:embed="rId2"/>
+          <a:stretch>
+            <a:fillRect/>
+          </a:stretch>
+        </p:blipFill>
+        <p:spPr>
+          <a:xfrm>
+            <a:off x="144672" y="0"/>
+            <a:ext cx="10683456" cy="5486400"/>
+          </a:xfrm>
+          <a:prstGeom prst="rect">
+            <a:avLst/>
+          </a:prstGeom>
+        </p:spPr>
+      </p:pic>
+    </p:spTree>
+  </p:cSld>
+  <p:clrMapOvr>
+    <a:masterClrMapping/>
+  </p:clrMapOvr>
+</p:sld>
+</file>
+
+<file path=ppt/slides/slide19.xml><?xml version="1.0" encoding="utf-8"?>
+<p:sld xmlns:p="http://schemas.openxmlformats.org/presentationml/2006/main" xmlns:a="http://schemas.openxmlformats.org/drawingml/2006/main" xmlns:r="http://schemas.openxmlformats.org/officeDocument/2006/relationships">
+  <p:cSld>
+    <p:spTree>
+      <p:nvGrpSpPr>
+        <p:cNvPr id="1" name=""/>
+        <p:cNvGrpSpPr/>
+        <p:nvPr/>
+      </p:nvGrpSpPr>
+      <p:grpSpPr>
+        <a:xfrm>
+          <a:off x="0" y="0"/>
+          <a:ext cx="0" cy="0"/>
+          <a:chOff x="0" y="0"/>
+          <a:chExt cx="0" cy="0"/>
+        </a:xfrm>
+      </p:grpSpPr>
+      <p:pic>
+        <p:nvPicPr>
+          <p:cNvPr descr="image-19-2.png" id="2" name="Media File"/>
+          <p:cNvPicPr>
+            <a:picLocks noChangeAspect="1"/>
+          </p:cNvPicPr>
+          <p:nvPr/>
+        </p:nvPicPr>
+        <p:blipFill>
+          <a:blip cstate="print" r:embed="rId2"/>
+          <a:stretch>
+            <a:fillRect/>
+          </a:stretch>
+        </p:blipFill>
+        <p:spPr>
+          <a:xfrm>
+            <a:off x="144672" y="0"/>
+            <a:ext cx="10683456" cy="5486400"/>
+          </a:xfrm>
+          <a:prstGeom prst="rect">
+            <a:avLst/>
+          </a:prstGeom>
+        </p:spPr>
+      </p:pic>
+    </p:spTree>
+  </p:cSld>
+  <p:clrMapOvr>
+    <a:masterClrMapping/>
+  </p:clrMapOvr>
+</p:sld>
+</file>
+
 <file path=ppt/slides/slide2.xml><?xml version="1.0" encoding="utf-8"?>
 <p:sld xmlns:p="http://schemas.openxmlformats.org/presentationml/2006/main" xmlns:a="http://schemas.openxmlformats.org/drawingml/2006/main" xmlns:r="http://schemas.openxmlformats.org/officeDocument/2006/relationships">
   <p:cSld>
@@ -582,6 +944,496 @@
 </p:sld>
 </file>
 
+<file path=ppt/slides/slide20.xml><?xml version="1.0" encoding="utf-8"?>
+<p:sld xmlns:p="http://schemas.openxmlformats.org/presentationml/2006/main" xmlns:a="http://schemas.openxmlformats.org/drawingml/2006/main" xmlns:r="http://schemas.openxmlformats.org/officeDocument/2006/relationships">
+  <p:cSld>
+    <p:spTree>
+      <p:nvGrpSpPr>
+        <p:cNvPr id="1" name=""/>
+        <p:cNvGrpSpPr/>
+        <p:nvPr/>
+      </p:nvGrpSpPr>
+      <p:grpSpPr>
+        <a:xfrm>
+          <a:off x="0" y="0"/>
+          <a:ext cx="0" cy="0"/>
+          <a:chOff x="0" y="0"/>
+          <a:chExt cx="0" cy="0"/>
+        </a:xfrm>
+      </p:grpSpPr>
+      <p:pic>
+        <p:nvPicPr>
+          <p:cNvPr descr="image-20-2.png" id="2" name="Media File"/>
+          <p:cNvPicPr>
+            <a:picLocks noChangeAspect="1"/>
+          </p:cNvPicPr>
+          <p:nvPr/>
+        </p:nvPicPr>
+        <p:blipFill>
+          <a:blip cstate="print" r:embed="rId2"/>
+          <a:stretch>
+            <a:fillRect/>
+          </a:stretch>
+        </p:blipFill>
+        <p:spPr>
+          <a:xfrm>
+            <a:off x="144672" y="0"/>
+            <a:ext cx="10683456" cy="5486400"/>
+          </a:xfrm>
+          <a:prstGeom prst="rect">
+            <a:avLst/>
+          </a:prstGeom>
+        </p:spPr>
+      </p:pic>
+    </p:spTree>
+  </p:cSld>
+  <p:clrMapOvr>
+    <a:masterClrMapping/>
+  </p:clrMapOvr>
+</p:sld>
+</file>
+
+<file path=ppt/slides/slide21.xml><?xml version="1.0" encoding="utf-8"?>
+<p:sld xmlns:p="http://schemas.openxmlformats.org/presentationml/2006/main" xmlns:a="http://schemas.openxmlformats.org/drawingml/2006/main" xmlns:r="http://schemas.openxmlformats.org/officeDocument/2006/relationships">
+  <p:cSld>
+    <p:spTree>
+      <p:nvGrpSpPr>
+        <p:cNvPr id="1" name=""/>
+        <p:cNvGrpSpPr/>
+        <p:nvPr/>
+      </p:nvGrpSpPr>
+      <p:grpSpPr>
+        <a:xfrm>
+          <a:off x="0" y="0"/>
+          <a:ext cx="0" cy="0"/>
+          <a:chOff x="0" y="0"/>
+          <a:chExt cx="0" cy="0"/>
+        </a:xfrm>
+      </p:grpSpPr>
+      <p:pic>
+        <p:nvPicPr>
+          <p:cNvPr descr="image-21-2.png" id="2" name="Media File"/>
+          <p:cNvPicPr>
+            <a:picLocks noChangeAspect="1"/>
+          </p:cNvPicPr>
+          <p:nvPr/>
+        </p:nvPicPr>
+        <p:blipFill>
+          <a:blip cstate="print" r:embed="rId2"/>
+          <a:stretch>
+            <a:fillRect/>
+          </a:stretch>
+        </p:blipFill>
+        <p:spPr>
+          <a:xfrm>
+            <a:off x="144672" y="0"/>
+            <a:ext cx="10683456" cy="5486400"/>
+          </a:xfrm>
+          <a:prstGeom prst="rect">
+            <a:avLst/>
+          </a:prstGeom>
+        </p:spPr>
+      </p:pic>
+    </p:spTree>
+  </p:cSld>
+  <p:clrMapOvr>
+    <a:masterClrMapping/>
+  </p:clrMapOvr>
+</p:sld>
+</file>
+
+<file path=ppt/slides/slide22.xml><?xml version="1.0" encoding="utf-8"?>
+<p:sld xmlns:p="http://schemas.openxmlformats.org/presentationml/2006/main" xmlns:a="http://schemas.openxmlformats.org/drawingml/2006/main" xmlns:r="http://schemas.openxmlformats.org/officeDocument/2006/relationships">
+  <p:cSld>
+    <p:spTree>
+      <p:nvGrpSpPr>
+        <p:cNvPr id="1" name=""/>
+        <p:cNvGrpSpPr/>
+        <p:nvPr/>
+      </p:nvGrpSpPr>
+      <p:grpSpPr>
+        <a:xfrm>
+          <a:off x="0" y="0"/>
+          <a:ext cx="0" cy="0"/>
+          <a:chOff x="0" y="0"/>
+          <a:chExt cx="0" cy="0"/>
+        </a:xfrm>
+      </p:grpSpPr>
+      <p:pic>
+        <p:nvPicPr>
+          <p:cNvPr descr="image-22-2.png" id="2" name="Media File"/>
+          <p:cNvPicPr>
+            <a:picLocks noChangeAspect="1"/>
+          </p:cNvPicPr>
+          <p:nvPr/>
+        </p:nvPicPr>
+        <p:blipFill>
+          <a:blip cstate="print" r:embed="rId2"/>
+          <a:stretch>
+            <a:fillRect/>
+          </a:stretch>
+        </p:blipFill>
+        <p:spPr>
+          <a:xfrm>
+            <a:off x="144672" y="0"/>
+            <a:ext cx="10683456" cy="5486400"/>
+          </a:xfrm>
+          <a:prstGeom prst="rect">
+            <a:avLst/>
+          </a:prstGeom>
+        </p:spPr>
+      </p:pic>
+    </p:spTree>
+  </p:cSld>
+  <p:clrMapOvr>
+    <a:masterClrMapping/>
+  </p:clrMapOvr>
+</p:sld>
+</file>
+
+<file path=ppt/slides/slide23.xml><?xml version="1.0" encoding="utf-8"?>
+<p:sld xmlns:p="http://schemas.openxmlformats.org/presentationml/2006/main" xmlns:a="http://schemas.openxmlformats.org/drawingml/2006/main" xmlns:r="http://schemas.openxmlformats.org/officeDocument/2006/relationships">
+  <p:cSld>
+    <p:spTree>
+      <p:nvGrpSpPr>
+        <p:cNvPr id="1" name=""/>
+        <p:cNvGrpSpPr/>
+        <p:nvPr/>
+      </p:nvGrpSpPr>
+      <p:grpSpPr>
+        <a:xfrm>
+          <a:off x="0" y="0"/>
+          <a:ext cx="0" cy="0"/>
+          <a:chOff x="0" y="0"/>
+          <a:chExt cx="0" cy="0"/>
+        </a:xfrm>
+      </p:grpSpPr>
+      <p:pic>
+        <p:nvPicPr>
+          <p:cNvPr descr="image-23-2.png" id="2" name="Media File"/>
+          <p:cNvPicPr>
+            <a:picLocks noChangeAspect="1"/>
+          </p:cNvPicPr>
+          <p:nvPr/>
+        </p:nvPicPr>
+        <p:blipFill>
+          <a:blip cstate="print" r:embed="rId2"/>
+          <a:stretch>
+            <a:fillRect/>
+          </a:stretch>
+        </p:blipFill>
+        <p:spPr>
+          <a:xfrm>
+            <a:off x="144672" y="0"/>
+            <a:ext cx="10683456" cy="5486400"/>
+          </a:xfrm>
+          <a:prstGeom prst="rect">
+            <a:avLst/>
+          </a:prstGeom>
+        </p:spPr>
+      </p:pic>
+    </p:spTree>
+  </p:cSld>
+  <p:clrMapOvr>
+    <a:masterClrMapping/>
+  </p:clrMapOvr>
+</p:sld>
+</file>
+
+<file path=ppt/slides/slide24.xml><?xml version="1.0" encoding="utf-8"?>
+<p:sld xmlns:p="http://schemas.openxmlformats.org/presentationml/2006/main" xmlns:a="http://schemas.openxmlformats.org/drawingml/2006/main" xmlns:r="http://schemas.openxmlformats.org/officeDocument/2006/relationships">
+  <p:cSld>
+    <p:spTree>
+      <p:nvGrpSpPr>
+        <p:cNvPr id="1" name=""/>
+        <p:cNvGrpSpPr/>
+        <p:nvPr/>
+      </p:nvGrpSpPr>
+      <p:grpSpPr>
+        <a:xfrm>
+          <a:off x="0" y="0"/>
+          <a:ext cx="0" cy="0"/>
+          <a:chOff x="0" y="0"/>
+          <a:chExt cx="0" cy="0"/>
+        </a:xfrm>
+      </p:grpSpPr>
+      <p:pic>
+        <p:nvPicPr>
+          <p:cNvPr descr="image-24-2.png" id="2" name="Media File"/>
+          <p:cNvPicPr>
+            <a:picLocks noChangeAspect="1"/>
+          </p:cNvPicPr>
+          <p:nvPr/>
+        </p:nvPicPr>
+        <p:blipFill>
+          <a:blip cstate="print" r:embed="rId2"/>
+          <a:stretch>
+            <a:fillRect/>
+          </a:stretch>
+        </p:blipFill>
+        <p:spPr>
+          <a:xfrm>
+            <a:off x="144672" y="0"/>
+            <a:ext cx="10683456" cy="5486400"/>
+          </a:xfrm>
+          <a:prstGeom prst="rect">
+            <a:avLst/>
+          </a:prstGeom>
+        </p:spPr>
+      </p:pic>
+    </p:spTree>
+  </p:cSld>
+  <p:clrMapOvr>
+    <a:masterClrMapping/>
+  </p:clrMapOvr>
+</p:sld>
+</file>
+
+<file path=ppt/slides/slide25.xml><?xml version="1.0" encoding="utf-8"?>
+<p:sld xmlns:p="http://schemas.openxmlformats.org/presentationml/2006/main" xmlns:a="http://schemas.openxmlformats.org/drawingml/2006/main" xmlns:r="http://schemas.openxmlformats.org/officeDocument/2006/relationships">
+  <p:cSld>
+    <p:spTree>
+      <p:nvGrpSpPr>
+        <p:cNvPr id="1" name=""/>
+        <p:cNvGrpSpPr/>
+        <p:nvPr/>
+      </p:nvGrpSpPr>
+      <p:grpSpPr>
+        <a:xfrm>
+          <a:off x="0" y="0"/>
+          <a:ext cx="0" cy="0"/>
+          <a:chOff x="0" y="0"/>
+          <a:chExt cx="0" cy="0"/>
+        </a:xfrm>
+      </p:grpSpPr>
+      <p:pic>
+        <p:nvPicPr>
+          <p:cNvPr descr="image-25-2.png" id="2" name="Media File"/>
+          <p:cNvPicPr>
+            <a:picLocks noChangeAspect="1"/>
+          </p:cNvPicPr>
+          <p:nvPr/>
+        </p:nvPicPr>
+        <p:blipFill>
+          <a:blip cstate="print" r:embed="rId2"/>
+          <a:stretch>
+            <a:fillRect/>
+          </a:stretch>
+        </p:blipFill>
+        <p:spPr>
+          <a:xfrm>
+            <a:off x="144672" y="0"/>
+            <a:ext cx="10683456" cy="5486400"/>
+          </a:xfrm>
+          <a:prstGeom prst="rect">
+            <a:avLst/>
+          </a:prstGeom>
+        </p:spPr>
+      </p:pic>
+    </p:spTree>
+  </p:cSld>
+  <p:clrMapOvr>
+    <a:masterClrMapping/>
+  </p:clrMapOvr>
+</p:sld>
+</file>
+
+<file path=ppt/slides/slide26.xml><?xml version="1.0" encoding="utf-8"?>
+<p:sld xmlns:p="http://schemas.openxmlformats.org/presentationml/2006/main" xmlns:a="http://schemas.openxmlformats.org/drawingml/2006/main" xmlns:r="http://schemas.openxmlformats.org/officeDocument/2006/relationships">
+  <p:cSld>
+    <p:spTree>
+      <p:nvGrpSpPr>
+        <p:cNvPr id="1" name=""/>
+        <p:cNvGrpSpPr/>
+        <p:nvPr/>
+      </p:nvGrpSpPr>
+      <p:grpSpPr>
+        <a:xfrm>
+          <a:off x="0" y="0"/>
+          <a:ext cx="0" cy="0"/>
+          <a:chOff x="0" y="0"/>
+          <a:chExt cx="0" cy="0"/>
+        </a:xfrm>
+      </p:grpSpPr>
+      <p:pic>
+        <p:nvPicPr>
+          <p:cNvPr descr="image-26-2.png" id="2" name="Media File"/>
+          <p:cNvPicPr>
+            <a:picLocks noChangeAspect="1"/>
+          </p:cNvPicPr>
+          <p:nvPr/>
+        </p:nvPicPr>
+        <p:blipFill>
+          <a:blip cstate="print" r:embed="rId2"/>
+          <a:stretch>
+            <a:fillRect/>
+          </a:stretch>
+        </p:blipFill>
+        <p:spPr>
+          <a:xfrm>
+            <a:off x="144672" y="0"/>
+            <a:ext cx="10683456" cy="5486400"/>
+          </a:xfrm>
+          <a:prstGeom prst="rect">
+            <a:avLst/>
+          </a:prstGeom>
+        </p:spPr>
+      </p:pic>
+    </p:spTree>
+  </p:cSld>
+  <p:clrMapOvr>
+    <a:masterClrMapping/>
+  </p:clrMapOvr>
+</p:sld>
+</file>
+
+<file path=ppt/slides/slide27.xml><?xml version="1.0" encoding="utf-8"?>
+<p:sld xmlns:p="http://schemas.openxmlformats.org/presentationml/2006/main" xmlns:a="http://schemas.openxmlformats.org/drawingml/2006/main" xmlns:r="http://schemas.openxmlformats.org/officeDocument/2006/relationships">
+  <p:cSld>
+    <p:spTree>
+      <p:nvGrpSpPr>
+        <p:cNvPr id="1" name=""/>
+        <p:cNvGrpSpPr/>
+        <p:nvPr/>
+      </p:nvGrpSpPr>
+      <p:grpSpPr>
+        <a:xfrm>
+          <a:off x="0" y="0"/>
+          <a:ext cx="0" cy="0"/>
+          <a:chOff x="0" y="0"/>
+          <a:chExt cx="0" cy="0"/>
+        </a:xfrm>
+      </p:grpSpPr>
+      <p:pic>
+        <p:nvPicPr>
+          <p:cNvPr descr="image-27-2.png" id="2" name="Media File"/>
+          <p:cNvPicPr>
+            <a:picLocks noChangeAspect="1"/>
+          </p:cNvPicPr>
+          <p:nvPr/>
+        </p:nvPicPr>
+        <p:blipFill>
+          <a:blip cstate="print" r:embed="rId2"/>
+          <a:stretch>
+            <a:fillRect/>
+          </a:stretch>
+        </p:blipFill>
+        <p:spPr>
+          <a:xfrm>
+            <a:off x="144672" y="0"/>
+            <a:ext cx="10683456" cy="5486400"/>
+          </a:xfrm>
+          <a:prstGeom prst="rect">
+            <a:avLst/>
+          </a:prstGeom>
+        </p:spPr>
+      </p:pic>
+    </p:spTree>
+  </p:cSld>
+  <p:clrMapOvr>
+    <a:masterClrMapping/>
+  </p:clrMapOvr>
+</p:sld>
+</file>
+
+<file path=ppt/slides/slide28.xml><?xml version="1.0" encoding="utf-8"?>
+<p:sld xmlns:p="http://schemas.openxmlformats.org/presentationml/2006/main" xmlns:a="http://schemas.openxmlformats.org/drawingml/2006/main" xmlns:r="http://schemas.openxmlformats.org/officeDocument/2006/relationships">
+  <p:cSld>
+    <p:spTree>
+      <p:nvGrpSpPr>
+        <p:cNvPr id="1" name=""/>
+        <p:cNvGrpSpPr/>
+        <p:nvPr/>
+      </p:nvGrpSpPr>
+      <p:grpSpPr>
+        <a:xfrm>
+          <a:off x="0" y="0"/>
+          <a:ext cx="0" cy="0"/>
+          <a:chOff x="0" y="0"/>
+          <a:chExt cx="0" cy="0"/>
+        </a:xfrm>
+      </p:grpSpPr>
+      <p:pic>
+        <p:nvPicPr>
+          <p:cNvPr descr="image-28-2.png" id="2" name="Media File"/>
+          <p:cNvPicPr>
+            <a:picLocks noChangeAspect="1"/>
+          </p:cNvPicPr>
+          <p:nvPr/>
+        </p:nvPicPr>
+        <p:blipFill>
+          <a:blip cstate="print" r:embed="rId2"/>
+          <a:stretch>
+            <a:fillRect/>
+          </a:stretch>
+        </p:blipFill>
+        <p:spPr>
+          <a:xfrm>
+            <a:off x="144672" y="0"/>
+            <a:ext cx="10683456" cy="5486400"/>
+          </a:xfrm>
+          <a:prstGeom prst="rect">
+            <a:avLst/>
+          </a:prstGeom>
+        </p:spPr>
+      </p:pic>
+    </p:spTree>
+  </p:cSld>
+  <p:clrMapOvr>
+    <a:masterClrMapping/>
+  </p:clrMapOvr>
+</p:sld>
+</file>
+
+<file path=ppt/slides/slide29.xml><?xml version="1.0" encoding="utf-8"?>
+<p:sld xmlns:p="http://schemas.openxmlformats.org/presentationml/2006/main" xmlns:a="http://schemas.openxmlformats.org/drawingml/2006/main" xmlns:r="http://schemas.openxmlformats.org/officeDocument/2006/relationships">
+  <p:cSld>
+    <p:spTree>
+      <p:nvGrpSpPr>
+        <p:cNvPr id="1" name=""/>
+        <p:cNvGrpSpPr/>
+        <p:nvPr/>
+      </p:nvGrpSpPr>
+      <p:grpSpPr>
+        <a:xfrm>
+          <a:off x="0" y="0"/>
+          <a:ext cx="0" cy="0"/>
+          <a:chOff x="0" y="0"/>
+          <a:chExt cx="0" cy="0"/>
+        </a:xfrm>
+      </p:grpSpPr>
+      <p:pic>
+        <p:nvPicPr>
+          <p:cNvPr descr="image-29-2.png" id="2" name="Media File"/>
+          <p:cNvPicPr>
+            <a:picLocks noChangeAspect="1"/>
+          </p:cNvPicPr>
+          <p:nvPr/>
+        </p:nvPicPr>
+        <p:blipFill>
+          <a:blip cstate="print" r:embed="rId2"/>
+          <a:stretch>
+            <a:fillRect/>
+          </a:stretch>
+        </p:blipFill>
+        <p:spPr>
+          <a:xfrm>
+            <a:off x="144672" y="0"/>
+            <a:ext cx="10683456" cy="5486400"/>
+          </a:xfrm>
+          <a:prstGeom prst="rect">
+            <a:avLst/>
+          </a:prstGeom>
+        </p:spPr>
+      </p:pic>
+    </p:spTree>
+  </p:cSld>
+  <p:clrMapOvr>
+    <a:masterClrMapping/>
+  </p:clrMapOvr>
+</p:sld>
+</file>
+
 <file path=ppt/slides/slide3.xml><?xml version="1.0" encoding="utf-8"?>
 <p:sld xmlns:p="http://schemas.openxmlformats.org/presentationml/2006/main" xmlns:a="http://schemas.openxmlformats.org/drawingml/2006/main" xmlns:r="http://schemas.openxmlformats.org/officeDocument/2006/relationships">
   <p:cSld>
@@ -602,6 +1454,104 @@
       <p:pic>
         <p:nvPicPr>
           <p:cNvPr descr="image-3-2.png" id="2" name="Media File"/>
+          <p:cNvPicPr>
+            <a:picLocks noChangeAspect="1"/>
+          </p:cNvPicPr>
+          <p:nvPr/>
+        </p:nvPicPr>
+        <p:blipFill>
+          <a:blip cstate="print" r:embed="rId2"/>
+          <a:stretch>
+            <a:fillRect/>
+          </a:stretch>
+        </p:blipFill>
+        <p:spPr>
+          <a:xfrm>
+            <a:off x="144672" y="0"/>
+            <a:ext cx="10683456" cy="5486400"/>
+          </a:xfrm>
+          <a:prstGeom prst="rect">
+            <a:avLst/>
+          </a:prstGeom>
+        </p:spPr>
+      </p:pic>
+    </p:spTree>
+  </p:cSld>
+  <p:clrMapOvr>
+    <a:masterClrMapping/>
+  </p:clrMapOvr>
+</p:sld>
+</file>
+
+<file path=ppt/slides/slide30.xml><?xml version="1.0" encoding="utf-8"?>
+<p:sld xmlns:p="http://schemas.openxmlformats.org/presentationml/2006/main" xmlns:a="http://schemas.openxmlformats.org/drawingml/2006/main" xmlns:r="http://schemas.openxmlformats.org/officeDocument/2006/relationships">
+  <p:cSld>
+    <p:spTree>
+      <p:nvGrpSpPr>
+        <p:cNvPr id="1" name=""/>
+        <p:cNvGrpSpPr/>
+        <p:nvPr/>
+      </p:nvGrpSpPr>
+      <p:grpSpPr>
+        <a:xfrm>
+          <a:off x="0" y="0"/>
+          <a:ext cx="0" cy="0"/>
+          <a:chOff x="0" y="0"/>
+          <a:chExt cx="0" cy="0"/>
+        </a:xfrm>
+      </p:grpSpPr>
+      <p:pic>
+        <p:nvPicPr>
+          <p:cNvPr descr="image-30-2.png" id="2" name="Media File"/>
+          <p:cNvPicPr>
+            <a:picLocks noChangeAspect="1"/>
+          </p:cNvPicPr>
+          <p:nvPr/>
+        </p:nvPicPr>
+        <p:blipFill>
+          <a:blip cstate="print" r:embed="rId2"/>
+          <a:stretch>
+            <a:fillRect/>
+          </a:stretch>
+        </p:blipFill>
+        <p:spPr>
+          <a:xfrm>
+            <a:off x="144672" y="0"/>
+            <a:ext cx="10683456" cy="5486400"/>
+          </a:xfrm>
+          <a:prstGeom prst="rect">
+            <a:avLst/>
+          </a:prstGeom>
+        </p:spPr>
+      </p:pic>
+    </p:spTree>
+  </p:cSld>
+  <p:clrMapOvr>
+    <a:masterClrMapping/>
+  </p:clrMapOvr>
+</p:sld>
+</file>
+
+<file path=ppt/slides/slide31.xml><?xml version="1.0" encoding="utf-8"?>
+<p:sld xmlns:p="http://schemas.openxmlformats.org/presentationml/2006/main" xmlns:a="http://schemas.openxmlformats.org/drawingml/2006/main" xmlns:r="http://schemas.openxmlformats.org/officeDocument/2006/relationships">
+  <p:cSld>
+    <p:spTree>
+      <p:nvGrpSpPr>
+        <p:cNvPr id="1" name=""/>
+        <p:cNvGrpSpPr/>
+        <p:nvPr/>
+      </p:nvGrpSpPr>
+      <p:grpSpPr>
+        <a:xfrm>
+          <a:off x="0" y="0"/>
+          <a:ext cx="0" cy="0"/>
+          <a:chOff x="0" y="0"/>
+          <a:chExt cx="0" cy="0"/>
+        </a:xfrm>
+      </p:grpSpPr>
+      <p:pic>
+        <p:nvPicPr>
+          <p:cNvPr descr="image-31-2.png" id="2" name="Media File"/>
           <p:cNvPicPr>
             <a:picLocks noChangeAspect="1"/>
           </p:cNvPicPr>

</xml_diff>